<commit_message>
added james and emily's portfolio
</commit_message>
<xml_diff>
--- a/Documentation/Story cards/PinkSpoon Story Cards.pptx
+++ b/Documentation/Story cards/PinkSpoon Story Cards.pptx
@@ -18,19 +18,18 @@
     <p:sldId id="282" r:id="rId12"/>
     <p:sldId id="293" r:id="rId13"/>
     <p:sldId id="266" r:id="rId14"/>
-    <p:sldId id="267" r:id="rId15"/>
-    <p:sldId id="268" r:id="rId16"/>
-    <p:sldId id="288" r:id="rId17"/>
-    <p:sldId id="270" r:id="rId18"/>
-    <p:sldId id="294" r:id="rId19"/>
-    <p:sldId id="278" r:id="rId20"/>
-    <p:sldId id="291" r:id="rId21"/>
-    <p:sldId id="273" r:id="rId22"/>
-    <p:sldId id="292" r:id="rId23"/>
-    <p:sldId id="285" r:id="rId24"/>
-    <p:sldId id="289" r:id="rId25"/>
-    <p:sldId id="290" r:id="rId26"/>
-    <p:sldId id="281" r:id="rId27"/>
+    <p:sldId id="268" r:id="rId15"/>
+    <p:sldId id="288" r:id="rId16"/>
+    <p:sldId id="270" r:id="rId17"/>
+    <p:sldId id="294" r:id="rId18"/>
+    <p:sldId id="278" r:id="rId19"/>
+    <p:sldId id="291" r:id="rId20"/>
+    <p:sldId id="273" r:id="rId21"/>
+    <p:sldId id="292" r:id="rId22"/>
+    <p:sldId id="285" r:id="rId23"/>
+    <p:sldId id="289" r:id="rId24"/>
+    <p:sldId id="290" r:id="rId25"/>
+    <p:sldId id="281" r:id="rId26"/>
   </p:sldIdLst>
   <p:sldSz cx="9906000" cy="6858000" type="A4"/>
   <p:notesSz cx="6858000" cy="9144000"/>
@@ -330,7 +329,7 @@
             <a:fld id="{1585DAA5-6BE2-467A-90B2-00E985D86198}" type="datetimeFigureOut">
               <a:rPr lang="en-AU" smtClean="0"/>
               <a:pPr/>
-              <a:t>21/3/18</a:t>
+              <a:t>30/5/18</a:t>
             </a:fld>
             <a:endParaRPr lang="en-AU"/>
           </a:p>
@@ -497,7 +496,7 @@
             <a:fld id="{1585DAA5-6BE2-467A-90B2-00E985D86198}" type="datetimeFigureOut">
               <a:rPr lang="en-AU" smtClean="0"/>
               <a:pPr/>
-              <a:t>21/3/18</a:t>
+              <a:t>30/5/18</a:t>
             </a:fld>
             <a:endParaRPr lang="en-AU"/>
           </a:p>
@@ -674,7 +673,7 @@
             <a:fld id="{1585DAA5-6BE2-467A-90B2-00E985D86198}" type="datetimeFigureOut">
               <a:rPr lang="en-AU" smtClean="0"/>
               <a:pPr/>
-              <a:t>21/3/18</a:t>
+              <a:t>30/5/18</a:t>
             </a:fld>
             <a:endParaRPr lang="en-AU"/>
           </a:p>
@@ -841,7 +840,7 @@
             <a:fld id="{1585DAA5-6BE2-467A-90B2-00E985D86198}" type="datetimeFigureOut">
               <a:rPr lang="en-AU" smtClean="0"/>
               <a:pPr/>
-              <a:t>21/3/18</a:t>
+              <a:t>30/5/18</a:t>
             </a:fld>
             <a:endParaRPr lang="en-AU"/>
           </a:p>
@@ -1084,7 +1083,7 @@
             <a:fld id="{1585DAA5-6BE2-467A-90B2-00E985D86198}" type="datetimeFigureOut">
               <a:rPr lang="en-AU" smtClean="0"/>
               <a:pPr/>
-              <a:t>21/3/18</a:t>
+              <a:t>30/5/18</a:t>
             </a:fld>
             <a:endParaRPr lang="en-AU"/>
           </a:p>
@@ -1369,7 +1368,7 @@
             <a:fld id="{1585DAA5-6BE2-467A-90B2-00E985D86198}" type="datetimeFigureOut">
               <a:rPr lang="en-AU" smtClean="0"/>
               <a:pPr/>
-              <a:t>21/3/18</a:t>
+              <a:t>30/5/18</a:t>
             </a:fld>
             <a:endParaRPr lang="en-AU"/>
           </a:p>
@@ -1788,7 +1787,7 @@
             <a:fld id="{1585DAA5-6BE2-467A-90B2-00E985D86198}" type="datetimeFigureOut">
               <a:rPr lang="en-AU" smtClean="0"/>
               <a:pPr/>
-              <a:t>21/3/18</a:t>
+              <a:t>30/5/18</a:t>
             </a:fld>
             <a:endParaRPr lang="en-AU"/>
           </a:p>
@@ -1903,7 +1902,7 @@
             <a:fld id="{1585DAA5-6BE2-467A-90B2-00E985D86198}" type="datetimeFigureOut">
               <a:rPr lang="en-AU" smtClean="0"/>
               <a:pPr/>
-              <a:t>21/3/18</a:t>
+              <a:t>30/5/18</a:t>
             </a:fld>
             <a:endParaRPr lang="en-AU"/>
           </a:p>
@@ -1995,7 +1994,7 @@
             <a:fld id="{1585DAA5-6BE2-467A-90B2-00E985D86198}" type="datetimeFigureOut">
               <a:rPr lang="en-AU" smtClean="0"/>
               <a:pPr/>
-              <a:t>21/3/18</a:t>
+              <a:t>30/5/18</a:t>
             </a:fld>
             <a:endParaRPr lang="en-AU"/>
           </a:p>
@@ -2269,7 +2268,7 @@
             <a:fld id="{1585DAA5-6BE2-467A-90B2-00E985D86198}" type="datetimeFigureOut">
               <a:rPr lang="en-AU" smtClean="0"/>
               <a:pPr/>
-              <a:t>21/3/18</a:t>
+              <a:t>30/5/18</a:t>
             </a:fld>
             <a:endParaRPr lang="en-AU"/>
           </a:p>
@@ -2519,7 +2518,7 @@
             <a:fld id="{1585DAA5-6BE2-467A-90B2-00E985D86198}" type="datetimeFigureOut">
               <a:rPr lang="en-AU" smtClean="0"/>
               <a:pPr/>
-              <a:t>21/3/18</a:t>
+              <a:t>30/5/18</a:t>
             </a:fld>
             <a:endParaRPr lang="en-AU"/>
           </a:p>
@@ -2729,7 +2728,7 @@
             <a:fld id="{1585DAA5-6BE2-467A-90B2-00E985D86198}" type="datetimeFigureOut">
               <a:rPr lang="en-AU" smtClean="0"/>
               <a:pPr/>
-              <a:t>21/3/18</a:t>
+              <a:t>30/5/18</a:t>
             </a:fld>
             <a:endParaRPr lang="en-AU"/>
           </a:p>
@@ -5465,7 +5464,7 @@
                   <a:schemeClr val="tx1"/>
                 </a:solidFill>
               </a:rPr>
-              <a:t>13</a:t>
+              <a:t>14</a:t>
             </a:r>
             <a:endParaRPr lang="en-AU" sz="2000" dirty="0">
               <a:solidFill>
@@ -5520,7 +5519,7 @@
             <a:pPr algn="ctr"/>
             <a:r>
               <a:rPr lang="en-AU" sz="2800" dirty="0" smtClean="0"/>
-              <a:t>Feedbacks</a:t>
+              <a:t>Cancellation/Rescheduling lessons</a:t>
             </a:r>
             <a:endParaRPr lang="en-AU" sz="2800" dirty="0"/>
           </a:p>
@@ -5534,8 +5533,8 @@
         </p:nvSpPr>
         <p:spPr>
           <a:xfrm>
-            <a:off x="39153" y="822470"/>
-            <a:ext cx="9828000" cy="1346989"/>
+            <a:off x="39153" y="822469"/>
+            <a:ext cx="9828000" cy="1364919"/>
           </a:xfrm>
           <a:prstGeom prst="rect">
             <a:avLst/>
@@ -5580,15 +5579,7 @@
                   <a:schemeClr val="tx1"/>
                 </a:solidFill>
               </a:rPr>
-              <a:t>As a music student I would like to </a:t>
-            </a:r>
-            <a:r>
-              <a:rPr lang="en-US" sz="2400" dirty="0" smtClean="0">
-                <a:solidFill>
-                  <a:schemeClr val="tx1"/>
-                </a:solidFill>
-              </a:rPr>
-              <a:t>view feedback from my teacher so that I can reflect on it and see how I can improve.</a:t>
+              <a:t>As a teacher, instant updates and access to any rescheduling updates in regards to a lesson would allow me to handle those situations in a timely manner.</a:t>
             </a:r>
             <a:endParaRPr lang="en-AU" sz="2400" dirty="0" smtClean="0">
               <a:solidFill>
@@ -5606,8 +5597,8 @@
         </p:nvSpPr>
         <p:spPr>
           <a:xfrm>
-            <a:off x="39153" y="2492188"/>
-            <a:ext cx="9828000" cy="2463342"/>
+            <a:off x="39153" y="2384612"/>
+            <a:ext cx="9828000" cy="1775012"/>
           </a:xfrm>
           <a:prstGeom prst="rect">
             <a:avLst/>
@@ -5666,7 +5657,7 @@
                   <a:schemeClr val="tx1"/>
                 </a:solidFill>
               </a:rPr>
-              <a:t> Clicking on the ‘feedback’ tab all the feedback the student has received from their teacher. </a:t>
+              <a:t>Student’s cancelling or changing available times during the week will send a notification to the teacher’s account/email/text.</a:t>
             </a:r>
           </a:p>
           <a:p>
@@ -5680,7 +5671,23 @@
                   <a:schemeClr val="tx1"/>
                 </a:solidFill>
               </a:rPr>
-              <a:t>Teacher leave feedback by going on the student’s account and clicking on the ‘leave feedback button’ which will provide a textbox. </a:t>
+              <a:t>Students cancel their lesson by clicking on the ‘</a:t>
+            </a:r>
+            <a:r>
+              <a:rPr lang="en-AU" sz="2000" dirty="0" err="1" smtClean="0">
+                <a:solidFill>
+                  <a:schemeClr val="tx1"/>
+                </a:solidFill>
+              </a:rPr>
+              <a:t>myLessons</a:t>
+            </a:r>
+            <a:r>
+              <a:rPr lang="en-AU" sz="2000" dirty="0" smtClean="0">
+                <a:solidFill>
+                  <a:schemeClr val="tx1"/>
+                </a:solidFill>
+              </a:rPr>
+              <a:t>’ tab, then clicking the ‘cancel’ button next to the lesson. </a:t>
             </a:r>
           </a:p>
           <a:p>
@@ -5688,14 +5695,22 @@
               <a:buFont typeface="Arial" pitchFamily="34" charset="0"/>
               <a:buChar char="•"/>
             </a:pPr>
-            <a:r>
-              <a:rPr lang="en-AU" sz="2000" dirty="0" smtClean="0">
-                <a:solidFill>
-                  <a:schemeClr val="tx1"/>
-                </a:solidFill>
-              </a:rPr>
-              <a:t>When the student reads the feedback, the student must click the ‘acknowledge’ button so that the teacher knows the student has read it.</a:t>
-            </a:r>
+            <a:endParaRPr lang="en-AU" sz="2000" dirty="0" smtClean="0">
+              <a:solidFill>
+                <a:schemeClr val="tx1"/>
+              </a:solidFill>
+            </a:endParaRPr>
+          </a:p>
+          <a:p>
+            <a:pPr marL="179388" indent="-179388">
+              <a:buFont typeface="Arial" pitchFamily="34" charset="0"/>
+              <a:buChar char="•"/>
+            </a:pPr>
+            <a:endParaRPr lang="en-AU" sz="2000" dirty="0" smtClean="0">
+              <a:solidFill>
+                <a:schemeClr val="tx1"/>
+              </a:solidFill>
+            </a:endParaRPr>
           </a:p>
         </p:txBody>
       </p:sp>
@@ -5836,8 +5851,8 @@
         </p:nvSpPr>
         <p:spPr>
           <a:xfrm>
-            <a:off x="39153" y="5128590"/>
-            <a:ext cx="9828000" cy="1620000"/>
+            <a:off x="39153" y="4356847"/>
+            <a:ext cx="9828000" cy="2391743"/>
           </a:xfrm>
           <a:prstGeom prst="rect">
             <a:avLst/>
@@ -5893,8 +5908,42 @@
                   <a:schemeClr val="tx1"/>
                 </a:solidFill>
               </a:rPr>
-              <a:t> </a:t>
-            </a:r>
+              <a:t>Student cannot get a refund for cancellations.</a:t>
+            </a:r>
+          </a:p>
+          <a:p>
+            <a:pPr marL="179388" indent="-179388">
+              <a:buFont typeface="Arial" pitchFamily="34" charset="0"/>
+              <a:buChar char="•"/>
+            </a:pPr>
+            <a:r>
+              <a:rPr lang="en-AU" sz="2000" dirty="0" smtClean="0">
+                <a:solidFill>
+                  <a:schemeClr val="tx1"/>
+                </a:solidFill>
+              </a:rPr>
+              <a:t>Students cancelling lessons within 24 hours before will receive a cancellation fee of 50%.</a:t>
+            </a:r>
+          </a:p>
+          <a:p>
+            <a:pPr marL="179388" indent="-179388">
+              <a:buFont typeface="Arial" pitchFamily="34" charset="0"/>
+              <a:buChar char="•"/>
+            </a:pPr>
+            <a:r>
+              <a:rPr lang="en-AU" sz="2000" dirty="0" smtClean="0">
+                <a:solidFill>
+                  <a:schemeClr val="tx1"/>
+                </a:solidFill>
+              </a:rPr>
+              <a:t>Teachers can’t cancel lesson. </a:t>
+            </a:r>
+          </a:p>
+          <a:p>
+            <a:pPr marL="179388" indent="-179388">
+              <a:buFont typeface="Arial" pitchFamily="34" charset="0"/>
+              <a:buChar char="•"/>
+            </a:pPr>
             <a:endParaRPr lang="en-AU" sz="2000" dirty="0">
               <a:solidFill>
                 <a:schemeClr val="tx1"/>
@@ -5906,7 +5955,7 @@
     </p:spTree>
     <p:extLst>
       <p:ext uri="{BB962C8B-B14F-4D97-AF65-F5344CB8AC3E}">
-        <p14:creationId xmlns:p14="http://schemas.microsoft.com/office/powerpoint/2010/main" val="896826910"/>
+        <p14:creationId xmlns:p14="http://schemas.microsoft.com/office/powerpoint/2010/main" val="2220230323"/>
       </p:ext>
     </p:extLst>
   </p:cSld>
@@ -5996,7 +6045,7 @@
                   <a:schemeClr val="tx1"/>
                 </a:solidFill>
               </a:rPr>
-              <a:t>14</a:t>
+              <a:t>15</a:t>
             </a:r>
             <a:endParaRPr lang="en-AU" sz="2000" dirty="0">
               <a:solidFill>
@@ -6051,7 +6100,7 @@
             <a:pPr algn="ctr"/>
             <a:r>
               <a:rPr lang="en-AU" sz="2800" dirty="0" smtClean="0"/>
-              <a:t>Cancellation/Rescheduling lessons</a:t>
+              <a:t>Viewing lesson types.</a:t>
             </a:r>
             <a:endParaRPr lang="en-AU" sz="2800" dirty="0"/>
           </a:p>
@@ -6065,8 +6114,8 @@
         </p:nvSpPr>
         <p:spPr>
           <a:xfrm>
-            <a:off x="39153" y="822469"/>
-            <a:ext cx="9828000" cy="1364919"/>
+            <a:off x="39153" y="822470"/>
+            <a:ext cx="9828000" cy="2340000"/>
           </a:xfrm>
           <a:prstGeom prst="rect">
             <a:avLst/>
@@ -6111,7 +6160,7 @@
                   <a:schemeClr val="tx1"/>
                 </a:solidFill>
               </a:rPr>
-              <a:t>As a teacher, instant updates and access to any rescheduling updates in regards to a lesson would allow me to handle those situations in a timely manner.</a:t>
+              <a:t>As a teacher when I log in I want to be able to see any information in regards to what sort of lesson I will be taking i.e. what instrument will be taught so that I can properly prepare before each lesson</a:t>
             </a:r>
             <a:endParaRPr lang="en-AU" sz="2400" dirty="0" smtClean="0">
               <a:solidFill>
@@ -6129,8 +6178,8 @@
         </p:nvSpPr>
         <p:spPr>
           <a:xfrm>
-            <a:off x="39153" y="2384612"/>
-            <a:ext cx="9828000" cy="1775012"/>
+            <a:off x="39153" y="3335530"/>
+            <a:ext cx="9828000" cy="1620000"/>
           </a:xfrm>
           <a:prstGeom prst="rect">
             <a:avLst/>
@@ -6189,60 +6238,8 @@
                   <a:schemeClr val="tx1"/>
                 </a:solidFill>
               </a:rPr>
-              <a:t>Student’s cancelling or changing available times during the week will send a notification to the teacher’s account/email/text.</a:t>
-            </a:r>
-          </a:p>
-          <a:p>
-            <a:pPr marL="179388" indent="-179388">
-              <a:buFont typeface="Arial" pitchFamily="34" charset="0"/>
-              <a:buChar char="•"/>
-            </a:pPr>
-            <a:r>
-              <a:rPr lang="en-AU" sz="2000" dirty="0" smtClean="0">
-                <a:solidFill>
-                  <a:schemeClr val="tx1"/>
-                </a:solidFill>
-              </a:rPr>
-              <a:t>Students cancel their lesson by clicking on the ‘</a:t>
-            </a:r>
-            <a:r>
-              <a:rPr lang="en-AU" sz="2000" dirty="0" err="1" smtClean="0">
-                <a:solidFill>
-                  <a:schemeClr val="tx1"/>
-                </a:solidFill>
-              </a:rPr>
-              <a:t>myLessons</a:t>
-            </a:r>
-            <a:r>
-              <a:rPr lang="en-AU" sz="2000" dirty="0" smtClean="0">
-                <a:solidFill>
-                  <a:schemeClr val="tx1"/>
-                </a:solidFill>
-              </a:rPr>
-              <a:t>’ tab, then clicking the ‘cancel’ button next to the lesson. </a:t>
-            </a:r>
-          </a:p>
-          <a:p>
-            <a:pPr marL="179388" indent="-179388">
-              <a:buFont typeface="Arial" pitchFamily="34" charset="0"/>
-              <a:buChar char="•"/>
-            </a:pPr>
-            <a:endParaRPr lang="en-AU" sz="2000" dirty="0" smtClean="0">
-              <a:solidFill>
-                <a:schemeClr val="tx1"/>
-              </a:solidFill>
-            </a:endParaRPr>
-          </a:p>
-          <a:p>
-            <a:pPr marL="179388" indent="-179388">
-              <a:buFont typeface="Arial" pitchFamily="34" charset="0"/>
-              <a:buChar char="•"/>
-            </a:pPr>
-            <a:endParaRPr lang="en-AU" sz="2000" dirty="0" smtClean="0">
-              <a:solidFill>
-                <a:schemeClr val="tx1"/>
-              </a:solidFill>
-            </a:endParaRPr>
+              <a:t>In the timetable, the music lesson displays the student’s name, instrument, and time length of the lesson.</a:t>
+            </a:r>
           </a:p>
         </p:txBody>
       </p:sp>
@@ -6300,7 +6297,7 @@
                   <a:schemeClr val="tx1"/>
                 </a:solidFill>
               </a:rPr>
-              <a:t>3</a:t>
+              <a:t>2</a:t>
             </a:r>
             <a:endParaRPr lang="en-AU" sz="2000" dirty="0">
               <a:solidFill>
@@ -6360,12 +6357,82 @@
           <a:p>
             <a:pPr algn="ctr"/>
             <a:r>
-              <a:rPr lang="en-AU" sz="2000" dirty="0" smtClean="0">
+              <a:rPr lang="en-AU" sz="2000" dirty="0">
                 <a:solidFill>
                   <a:schemeClr val="tx1"/>
                 </a:solidFill>
               </a:rPr>
               <a:t>S</a:t>
+            </a:r>
+          </a:p>
+        </p:txBody>
+      </p:sp>
+      <p:sp>
+        <p:nvSpPr>
+          <p:cNvPr id="13" name="Rectangle 12"/>
+          <p:cNvSpPr/>
+          <p:nvPr/>
+        </p:nvSpPr>
+        <p:spPr>
+          <a:xfrm>
+            <a:off x="39153" y="5128590"/>
+            <a:ext cx="9828000" cy="1620000"/>
+          </a:xfrm>
+          <a:prstGeom prst="rect">
+            <a:avLst/>
+          </a:prstGeom>
+          <a:solidFill>
+            <a:schemeClr val="bg1"/>
+          </a:solidFill>
+          <a:ln>
+            <a:solidFill>
+              <a:schemeClr val="accent1">
+                <a:lumMod val="50000"/>
+              </a:schemeClr>
+            </a:solidFill>
+          </a:ln>
+        </p:spPr>
+        <p:style>
+          <a:lnRef idx="2">
+            <a:schemeClr val="accent1">
+              <a:shade val="50000"/>
+            </a:schemeClr>
+          </a:lnRef>
+          <a:fillRef idx="1">
+            <a:schemeClr val="accent1"/>
+          </a:fillRef>
+          <a:effectRef idx="0">
+            <a:schemeClr val="accent1"/>
+          </a:effectRef>
+          <a:fontRef idx="minor">
+            <a:schemeClr val="lt1"/>
+          </a:fontRef>
+        </p:style>
+        <p:txBody>
+          <a:bodyPr tIns="36000" rtlCol="0" anchor="t" anchorCtr="0"/>
+          <a:lstStyle/>
+          <a:p>
+            <a:r>
+              <a:rPr lang="en-AU" sz="2000" dirty="0" smtClean="0">
+                <a:solidFill>
+                  <a:schemeClr val="tx1"/>
+                </a:solidFill>
+              </a:rPr>
+              <a:t>Notes</a:t>
+            </a:r>
+          </a:p>
+          <a:p>
+            <a:pPr marL="179388" indent="-179388">
+              <a:buFont typeface="Arial" pitchFamily="34" charset="0"/>
+              <a:buChar char="•"/>
+            </a:pPr>
+            <a:r>
+              <a:rPr lang="en-AU" sz="2000" dirty="0" smtClean="0">
+                <a:solidFill>
+                  <a:schemeClr val="tx1"/>
+                </a:solidFill>
+              </a:rPr>
+              <a:t> </a:t>
             </a:r>
             <a:endParaRPr lang="en-AU" sz="2000" dirty="0">
               <a:solidFill>
@@ -6375,119 +6442,10 @@
           </a:p>
         </p:txBody>
       </p:sp>
-      <p:sp>
-        <p:nvSpPr>
-          <p:cNvPr id="13" name="Rectangle 12"/>
-          <p:cNvSpPr/>
-          <p:nvPr/>
-        </p:nvSpPr>
-        <p:spPr>
-          <a:xfrm>
-            <a:off x="39153" y="4356847"/>
-            <a:ext cx="9828000" cy="2391743"/>
-          </a:xfrm>
-          <a:prstGeom prst="rect">
-            <a:avLst/>
-          </a:prstGeom>
-          <a:solidFill>
-            <a:schemeClr val="bg1"/>
-          </a:solidFill>
-          <a:ln>
-            <a:solidFill>
-              <a:schemeClr val="accent1">
-                <a:lumMod val="50000"/>
-              </a:schemeClr>
-            </a:solidFill>
-          </a:ln>
-        </p:spPr>
-        <p:style>
-          <a:lnRef idx="2">
-            <a:schemeClr val="accent1">
-              <a:shade val="50000"/>
-            </a:schemeClr>
-          </a:lnRef>
-          <a:fillRef idx="1">
-            <a:schemeClr val="accent1"/>
-          </a:fillRef>
-          <a:effectRef idx="0">
-            <a:schemeClr val="accent1"/>
-          </a:effectRef>
-          <a:fontRef idx="minor">
-            <a:schemeClr val="lt1"/>
-          </a:fontRef>
-        </p:style>
-        <p:txBody>
-          <a:bodyPr tIns="36000" rtlCol="0" anchor="t" anchorCtr="0"/>
-          <a:lstStyle/>
-          <a:p>
-            <a:r>
-              <a:rPr lang="en-AU" sz="2000" dirty="0" smtClean="0">
-                <a:solidFill>
-                  <a:schemeClr val="tx1"/>
-                </a:solidFill>
-              </a:rPr>
-              <a:t>Notes</a:t>
-            </a:r>
-          </a:p>
-          <a:p>
-            <a:pPr marL="179388" indent="-179388">
-              <a:buFont typeface="Arial" pitchFamily="34" charset="0"/>
-              <a:buChar char="•"/>
-            </a:pPr>
-            <a:r>
-              <a:rPr lang="en-AU" sz="2000" dirty="0" smtClean="0">
-                <a:solidFill>
-                  <a:schemeClr val="tx1"/>
-                </a:solidFill>
-              </a:rPr>
-              <a:t>Student cannot get a refund for cancellations.</a:t>
-            </a:r>
-          </a:p>
-          <a:p>
-            <a:pPr marL="179388" indent="-179388">
-              <a:buFont typeface="Arial" pitchFamily="34" charset="0"/>
-              <a:buChar char="•"/>
-            </a:pPr>
-            <a:r>
-              <a:rPr lang="en-AU" sz="2000" dirty="0" smtClean="0">
-                <a:solidFill>
-                  <a:schemeClr val="tx1"/>
-                </a:solidFill>
-              </a:rPr>
-              <a:t>Students cancelling lessons within 24 hours before will receive a cancellation fee of 50%.</a:t>
-            </a:r>
-          </a:p>
-          <a:p>
-            <a:pPr marL="179388" indent="-179388">
-              <a:buFont typeface="Arial" pitchFamily="34" charset="0"/>
-              <a:buChar char="•"/>
-            </a:pPr>
-            <a:r>
-              <a:rPr lang="en-AU" sz="2000" dirty="0" smtClean="0">
-                <a:solidFill>
-                  <a:schemeClr val="tx1"/>
-                </a:solidFill>
-              </a:rPr>
-              <a:t>Teachers can’t cancel lesson. </a:t>
-            </a:r>
-          </a:p>
-          <a:p>
-            <a:pPr marL="179388" indent="-179388">
-              <a:buFont typeface="Arial" pitchFamily="34" charset="0"/>
-              <a:buChar char="•"/>
-            </a:pPr>
-            <a:endParaRPr lang="en-AU" sz="2000" dirty="0">
-              <a:solidFill>
-                <a:schemeClr val="tx1"/>
-              </a:solidFill>
-            </a:endParaRPr>
-          </a:p>
-        </p:txBody>
-      </p:sp>
     </p:spTree>
     <p:extLst>
       <p:ext uri="{BB962C8B-B14F-4D97-AF65-F5344CB8AC3E}">
-        <p14:creationId xmlns:p14="http://schemas.microsoft.com/office/powerpoint/2010/main" val="2220230323"/>
+        <p14:creationId xmlns:p14="http://schemas.microsoft.com/office/powerpoint/2010/main" val="1790830576"/>
       </p:ext>
     </p:extLst>
   </p:cSld>
@@ -6577,7 +6535,7 @@
                   <a:schemeClr val="tx1"/>
                 </a:solidFill>
               </a:rPr>
-              <a:t>15</a:t>
+              <a:t>16</a:t>
             </a:r>
             <a:endParaRPr lang="en-AU" sz="2000" dirty="0">
               <a:solidFill>
@@ -6632,7 +6590,7 @@
             <a:pPr algn="ctr"/>
             <a:r>
               <a:rPr lang="en-AU" sz="2800" dirty="0" smtClean="0"/>
-              <a:t>Viewing lesson types.</a:t>
+              <a:t>Language</a:t>
             </a:r>
             <a:endParaRPr lang="en-AU" sz="2800" dirty="0"/>
           </a:p>
@@ -6692,7 +6650,7 @@
                   <a:schemeClr val="tx1"/>
                 </a:solidFill>
               </a:rPr>
-              <a:t>As a teacher when I log in I want to be able to see any information in regards to what sort of lesson I will be taking i.e. what instrument will be taught so that I can properly prepare before each lesson</a:t>
+              <a:t>As a parent, I’d like to be able to request a teacher that can speak our foreign language so I can get a better understanding of my child’s feedback.</a:t>
             </a:r>
             <a:endParaRPr lang="en-AU" sz="2400" dirty="0" smtClean="0">
               <a:solidFill>
@@ -6770,7 +6728,21 @@
                   <a:schemeClr val="tx1"/>
                 </a:solidFill>
               </a:rPr>
-              <a:t>In the timetable, the music lesson displays the student’s name, instrument, and time length of the lesson.</a:t>
+              <a:t>Student can choose their preferred language from a dropdown menu at the top of a booking page.</a:t>
+            </a:r>
+          </a:p>
+          <a:p>
+            <a:pPr marL="179388" indent="-179388">
+              <a:buFont typeface="Arial" pitchFamily="34" charset="0"/>
+              <a:buChar char="•"/>
+            </a:pPr>
+            <a:r>
+              <a:rPr lang="en-AU" sz="2000" dirty="0" smtClean="0">
+                <a:solidFill>
+                  <a:schemeClr val="tx1"/>
+                </a:solidFill>
+              </a:rPr>
+              <a:t>This filters out which teacher speaks the selected language and displays the lessons times the student can select. </a:t>
             </a:r>
           </a:p>
         </p:txBody>
@@ -6829,7 +6801,7 @@
                   <a:schemeClr val="tx1"/>
                 </a:solidFill>
               </a:rPr>
-              <a:t>2</a:t>
+              <a:t>2.5</a:t>
             </a:r>
             <a:endParaRPr lang="en-AU" sz="2000" dirty="0">
               <a:solidFill>
@@ -6959,12 +6931,34 @@
               <a:buChar char="•"/>
             </a:pPr>
             <a:r>
-              <a:rPr lang="en-AU" sz="2000" dirty="0" smtClean="0">
-                <a:solidFill>
-                  <a:schemeClr val="tx1"/>
-                </a:solidFill>
-              </a:rPr>
-              <a:t> </a:t>
+              <a:rPr lang="en-AU" sz="2000" dirty="0">
+                <a:solidFill>
+                  <a:schemeClr val="tx1"/>
+                </a:solidFill>
+              </a:rPr>
+              <a:t>A</a:t>
+            </a:r>
+            <a:r>
+              <a:rPr lang="en-AU" sz="2000" dirty="0" smtClean="0">
+                <a:solidFill>
+                  <a:schemeClr val="tx1"/>
+                </a:solidFill>
+              </a:rPr>
+              <a:t>ll customers can request for a speaking different language. </a:t>
+            </a:r>
+          </a:p>
+          <a:p>
+            <a:pPr marL="179388" indent="-179388">
+              <a:buFont typeface="Arial" pitchFamily="34" charset="0"/>
+              <a:buChar char="•"/>
+            </a:pPr>
+            <a:r>
+              <a:rPr lang="en-AU" sz="2000" dirty="0" smtClean="0">
+                <a:solidFill>
+                  <a:schemeClr val="tx1"/>
+                </a:solidFill>
+              </a:rPr>
+              <a:t>Not every language can be offered. Subject to teacher’s knowledge. </a:t>
             </a:r>
             <a:endParaRPr lang="en-AU" sz="2000" dirty="0">
               <a:solidFill>
@@ -6977,7 +6971,7 @@
     </p:spTree>
     <p:extLst>
       <p:ext uri="{BB962C8B-B14F-4D97-AF65-F5344CB8AC3E}">
-        <p14:creationId xmlns:p14="http://schemas.microsoft.com/office/powerpoint/2010/main" val="1790830576"/>
+        <p14:creationId xmlns:p14="http://schemas.microsoft.com/office/powerpoint/2010/main" val="81476069"/>
       </p:ext>
     </p:extLst>
   </p:cSld>
@@ -7067,7 +7061,288 @@
                   <a:schemeClr val="tx1"/>
                 </a:solidFill>
               </a:rPr>
-              <a:t>16</a:t>
+              <a:t>17</a:t>
+            </a:r>
+          </a:p>
+        </p:txBody>
+      </p:sp>
+      <p:sp>
+        <p:nvSpPr>
+          <p:cNvPr id="6" name="Rectangle 5"/>
+          <p:cNvSpPr/>
+          <p:nvPr/>
+        </p:nvSpPr>
+        <p:spPr>
+          <a:xfrm>
+            <a:off x="831153" y="109410"/>
+            <a:ext cx="7380000" cy="540000"/>
+          </a:xfrm>
+          <a:prstGeom prst="rect">
+            <a:avLst/>
+          </a:prstGeom>
+          <a:ln>
+            <a:solidFill>
+              <a:schemeClr val="accent1">
+                <a:lumMod val="50000"/>
+              </a:schemeClr>
+            </a:solidFill>
+          </a:ln>
+        </p:spPr>
+        <p:style>
+          <a:lnRef idx="2">
+            <a:schemeClr val="accent1">
+              <a:shade val="50000"/>
+            </a:schemeClr>
+          </a:lnRef>
+          <a:fillRef idx="1">
+            <a:schemeClr val="accent1"/>
+          </a:fillRef>
+          <a:effectRef idx="0">
+            <a:schemeClr val="accent1"/>
+          </a:effectRef>
+          <a:fontRef idx="minor">
+            <a:schemeClr val="lt1"/>
+          </a:fontRef>
+        </p:style>
+        <p:txBody>
+          <a:bodyPr rtlCol="0" anchor="ctr"/>
+          <a:lstStyle/>
+          <a:p>
+            <a:pPr algn="ctr"/>
+            <a:r>
+              <a:rPr lang="en-AU" sz="2800" dirty="0" smtClean="0"/>
+              <a:t>Customer review</a:t>
+            </a:r>
+            <a:endParaRPr lang="en-AU" sz="2800" dirty="0"/>
+          </a:p>
+        </p:txBody>
+      </p:sp>
+      <p:sp>
+        <p:nvSpPr>
+          <p:cNvPr id="7" name="Rectangle 6"/>
+          <p:cNvSpPr/>
+          <p:nvPr/>
+        </p:nvSpPr>
+        <p:spPr>
+          <a:xfrm>
+            <a:off x="39153" y="822470"/>
+            <a:ext cx="9828000" cy="2340000"/>
+          </a:xfrm>
+          <a:prstGeom prst="rect">
+            <a:avLst/>
+          </a:prstGeom>
+          <a:solidFill>
+            <a:schemeClr val="tx2">
+              <a:lumMod val="20000"/>
+              <a:lumOff val="80000"/>
+            </a:schemeClr>
+          </a:solidFill>
+          <a:ln>
+            <a:solidFill>
+              <a:schemeClr val="accent1">
+                <a:lumMod val="50000"/>
+              </a:schemeClr>
+            </a:solidFill>
+          </a:ln>
+        </p:spPr>
+        <p:style>
+          <a:lnRef idx="2">
+            <a:schemeClr val="accent1">
+              <a:shade val="50000"/>
+            </a:schemeClr>
+          </a:lnRef>
+          <a:fillRef idx="1">
+            <a:schemeClr val="accent1"/>
+          </a:fillRef>
+          <a:effectRef idx="0">
+            <a:schemeClr val="accent1"/>
+          </a:effectRef>
+          <a:fontRef idx="minor">
+            <a:schemeClr val="lt1"/>
+          </a:fontRef>
+        </p:style>
+        <p:txBody>
+          <a:bodyPr rtlCol="0" anchor="t" anchorCtr="0"/>
+          <a:lstStyle/>
+          <a:p>
+            <a:pPr marL="179388" indent="-179388">
+              <a:buFont typeface="Arial" pitchFamily="34" charset="0"/>
+              <a:buChar char="•"/>
+            </a:pPr>
+            <a:r>
+              <a:rPr lang="en-US" sz="2400" dirty="0">
+                <a:solidFill>
+                  <a:schemeClr val="tx1"/>
+                </a:solidFill>
+              </a:rPr>
+              <a:t>As the </a:t>
+            </a:r>
+            <a:r>
+              <a:rPr lang="en-US" sz="2400" dirty="0" smtClean="0">
+                <a:solidFill>
+                  <a:schemeClr val="tx1"/>
+                </a:solidFill>
+              </a:rPr>
+              <a:t>owner, I want the public to see past and current student’s comments on the school and their experience so that I can </a:t>
+            </a:r>
+            <a:r>
+              <a:rPr lang="en-AU" sz="2400" dirty="0" smtClean="0">
+                <a:solidFill>
+                  <a:schemeClr val="tx1"/>
+                </a:solidFill>
+              </a:rPr>
+              <a:t>get more students to join and build a bigger community. </a:t>
+            </a:r>
+            <a:endParaRPr lang="en-AU" sz="2400" dirty="0">
+              <a:solidFill>
+                <a:schemeClr val="tx1"/>
+              </a:solidFill>
+            </a:endParaRPr>
+          </a:p>
+        </p:txBody>
+      </p:sp>
+      <p:sp>
+        <p:nvSpPr>
+          <p:cNvPr id="8" name="Rectangle 7"/>
+          <p:cNvSpPr/>
+          <p:nvPr/>
+        </p:nvSpPr>
+        <p:spPr>
+          <a:xfrm>
+            <a:off x="39153" y="3335530"/>
+            <a:ext cx="9828000" cy="1620000"/>
+          </a:xfrm>
+          <a:prstGeom prst="rect">
+            <a:avLst/>
+          </a:prstGeom>
+          <a:solidFill>
+            <a:schemeClr val="accent1">
+              <a:lumMod val="20000"/>
+              <a:lumOff val="80000"/>
+            </a:schemeClr>
+          </a:solidFill>
+          <a:ln>
+            <a:solidFill>
+              <a:schemeClr val="accent1">
+                <a:lumMod val="50000"/>
+              </a:schemeClr>
+            </a:solidFill>
+          </a:ln>
+        </p:spPr>
+        <p:style>
+          <a:lnRef idx="2">
+            <a:schemeClr val="accent1">
+              <a:shade val="50000"/>
+            </a:schemeClr>
+          </a:lnRef>
+          <a:fillRef idx="1">
+            <a:schemeClr val="accent1"/>
+          </a:fillRef>
+          <a:effectRef idx="0">
+            <a:schemeClr val="accent1"/>
+          </a:effectRef>
+          <a:fontRef idx="minor">
+            <a:schemeClr val="lt1"/>
+          </a:fontRef>
+        </p:style>
+        <p:txBody>
+          <a:bodyPr tIns="36000" rtlCol="0" anchor="t" anchorCtr="0"/>
+          <a:lstStyle/>
+          <a:p>
+            <a:r>
+              <a:rPr lang="en-AU" sz="2000" dirty="0" smtClean="0">
+                <a:solidFill>
+                  <a:schemeClr val="tx1"/>
+                </a:solidFill>
+              </a:rPr>
+              <a:t>Acceptance Criteria</a:t>
+            </a:r>
+          </a:p>
+          <a:p>
+            <a:pPr marL="179388" indent="-179388">
+              <a:buFont typeface="Arial" pitchFamily="34" charset="0"/>
+              <a:buChar char="•"/>
+            </a:pPr>
+            <a:r>
+              <a:rPr lang="en-AU" sz="2000" dirty="0" smtClean="0">
+                <a:solidFill>
+                  <a:schemeClr val="tx1"/>
+                </a:solidFill>
+              </a:rPr>
+              <a:t>Have a page showing people’s experience and reviews.</a:t>
+            </a:r>
+          </a:p>
+          <a:p>
+            <a:pPr marL="179388" indent="-179388">
+              <a:buFont typeface="Arial" pitchFamily="34" charset="0"/>
+              <a:buChar char="•"/>
+            </a:pPr>
+            <a:r>
+              <a:rPr lang="en-AU" sz="2000" dirty="0" smtClean="0">
+                <a:solidFill>
+                  <a:schemeClr val="tx1"/>
+                </a:solidFill>
+              </a:rPr>
+              <a:t>Have a review button to pull up a form to submit to the website.</a:t>
+            </a:r>
+          </a:p>
+        </p:txBody>
+      </p:sp>
+      <p:sp>
+        <p:nvSpPr>
+          <p:cNvPr id="11" name="Rectangle 10"/>
+          <p:cNvSpPr/>
+          <p:nvPr/>
+        </p:nvSpPr>
+        <p:spPr>
+          <a:xfrm>
+            <a:off x="9147153" y="109410"/>
+            <a:ext cx="720000" cy="540000"/>
+          </a:xfrm>
+          <a:prstGeom prst="rect">
+            <a:avLst/>
+          </a:prstGeom>
+          <a:solidFill>
+            <a:srgbClr val="CCF0CD">
+              <a:alpha val="20000"/>
+            </a:srgbClr>
+          </a:solidFill>
+          <a:ln>
+            <a:solidFill>
+              <a:schemeClr val="accent1">
+                <a:lumMod val="50000"/>
+              </a:schemeClr>
+            </a:solidFill>
+          </a:ln>
+        </p:spPr>
+        <p:style>
+          <a:lnRef idx="2">
+            <a:schemeClr val="accent1">
+              <a:shade val="50000"/>
+            </a:schemeClr>
+          </a:lnRef>
+          <a:fillRef idx="1">
+            <a:schemeClr val="accent1"/>
+          </a:fillRef>
+          <a:effectRef idx="0">
+            <a:schemeClr val="accent1"/>
+          </a:effectRef>
+          <a:fontRef idx="minor">
+            <a:schemeClr val="lt1"/>
+          </a:fontRef>
+        </p:style>
+        <p:txBody>
+          <a:bodyPr wrap="square" lIns="0" rIns="0" rtlCol="0" anchor="ctr"/>
+          <a:lstStyle/>
+          <a:p>
+            <a:pPr algn="ctr"/>
+            <a:r>
+              <a:rPr lang="en-AU" sz="2000" dirty="0" smtClean="0">
+                <a:solidFill>
+                  <a:schemeClr val="tx1"/>
+                </a:solidFill>
+              </a:rPr>
+              <a:t>2</a:t>
             </a:r>
             <a:endParaRPr lang="en-AU" sz="2000" dirty="0">
               <a:solidFill>
@@ -7079,71 +7354,20 @@
       </p:sp>
       <p:sp>
         <p:nvSpPr>
-          <p:cNvPr id="6" name="Rectangle 5"/>
-          <p:cNvSpPr/>
-          <p:nvPr/>
-        </p:nvSpPr>
-        <p:spPr>
-          <a:xfrm>
-            <a:off x="831153" y="109410"/>
-            <a:ext cx="7380000" cy="540000"/>
-          </a:xfrm>
-          <a:prstGeom prst="rect">
-            <a:avLst/>
-          </a:prstGeom>
-          <a:ln>
-            <a:solidFill>
-              <a:schemeClr val="accent1">
-                <a:lumMod val="50000"/>
-              </a:schemeClr>
-            </a:solidFill>
-          </a:ln>
-        </p:spPr>
-        <p:style>
-          <a:lnRef idx="2">
-            <a:schemeClr val="accent1">
-              <a:shade val="50000"/>
-            </a:schemeClr>
-          </a:lnRef>
-          <a:fillRef idx="1">
-            <a:schemeClr val="accent1"/>
-          </a:fillRef>
-          <a:effectRef idx="0">
-            <a:schemeClr val="accent1"/>
-          </a:effectRef>
-          <a:fontRef idx="minor">
-            <a:schemeClr val="lt1"/>
-          </a:fontRef>
-        </p:style>
-        <p:txBody>
-          <a:bodyPr rtlCol="0" anchor="ctr"/>
-          <a:lstStyle/>
-          <a:p>
-            <a:pPr algn="ctr"/>
-            <a:r>
-              <a:rPr lang="en-AU" sz="2800" dirty="0" smtClean="0"/>
-              <a:t>Language</a:t>
-            </a:r>
-            <a:endParaRPr lang="en-AU" sz="2800" dirty="0"/>
-          </a:p>
-        </p:txBody>
-      </p:sp>
-      <p:sp>
-        <p:nvSpPr>
-          <p:cNvPr id="7" name="Rectangle 6"/>
-          <p:cNvSpPr/>
-          <p:nvPr/>
-        </p:nvSpPr>
-        <p:spPr>
-          <a:xfrm>
-            <a:off x="39153" y="822470"/>
-            <a:ext cx="9828000" cy="2340000"/>
-          </a:xfrm>
-          <a:prstGeom prst="rect">
-            <a:avLst/>
-          </a:prstGeom>
-          <a:solidFill>
-            <a:schemeClr val="tx2">
+          <p:cNvPr id="12" name="Rectangle 11"/>
+          <p:cNvSpPr/>
+          <p:nvPr/>
+        </p:nvSpPr>
+        <p:spPr>
+          <a:xfrm>
+            <a:off x="8283153" y="109410"/>
+            <a:ext cx="792000" cy="540000"/>
+          </a:xfrm>
+          <a:prstGeom prst="rect">
+            <a:avLst/>
+          </a:prstGeom>
+          <a:solidFill>
+            <a:schemeClr val="accent4">
               <a:lumMod val="20000"/>
               <a:lumOff val="80000"/>
             </a:schemeClr>
@@ -7173,44 +7397,37 @@
           </a:fontRef>
         </p:style>
         <p:txBody>
-          <a:bodyPr rtlCol="0" anchor="t" anchorCtr="0"/>
-          <a:lstStyle/>
-          <a:p>
-            <a:r>
-              <a:rPr lang="en-US" sz="2400" dirty="0">
-                <a:solidFill>
-                  <a:schemeClr val="tx1"/>
-                </a:solidFill>
-              </a:rPr>
-              <a:t>As a parent, I’d like to be able to request a teacher that can speak our foreign language so I can get a better understanding of my child’s feedback.</a:t>
-            </a:r>
-            <a:endParaRPr lang="en-AU" sz="2400" dirty="0" smtClean="0">
-              <a:solidFill>
-                <a:schemeClr val="tx1"/>
-              </a:solidFill>
-            </a:endParaRPr>
-          </a:p>
-        </p:txBody>
-      </p:sp>
-      <p:sp>
-        <p:nvSpPr>
-          <p:cNvPr id="8" name="Rectangle 7"/>
-          <p:cNvSpPr/>
-          <p:nvPr/>
-        </p:nvSpPr>
-        <p:spPr>
-          <a:xfrm>
-            <a:off x="39153" y="3335530"/>
+          <a:bodyPr wrap="none" lIns="0" rIns="0" rtlCol="0" anchor="ctr"/>
+          <a:lstStyle/>
+          <a:p>
+            <a:pPr algn="ctr"/>
+            <a:r>
+              <a:rPr lang="en-AU" sz="2000" dirty="0">
+                <a:solidFill>
+                  <a:schemeClr val="tx1"/>
+                </a:solidFill>
+              </a:rPr>
+              <a:t>C</a:t>
+            </a:r>
+          </a:p>
+        </p:txBody>
+      </p:sp>
+      <p:sp>
+        <p:nvSpPr>
+          <p:cNvPr id="13" name="Rectangle 12"/>
+          <p:cNvSpPr/>
+          <p:nvPr/>
+        </p:nvSpPr>
+        <p:spPr>
+          <a:xfrm>
+            <a:off x="39153" y="5128590"/>
             <a:ext cx="9828000" cy="1620000"/>
           </a:xfrm>
           <a:prstGeom prst="rect">
             <a:avLst/>
           </a:prstGeom>
           <a:solidFill>
-            <a:schemeClr val="accent1">
-              <a:lumMod val="20000"/>
-              <a:lumOff val="80000"/>
-            </a:schemeClr>
+            <a:schemeClr val="bg1"/>
           </a:solidFill>
           <a:ln>
             <a:solidFill>
@@ -7246,7 +7463,7 @@
                   <a:schemeClr val="tx1"/>
                 </a:solidFill>
               </a:rPr>
-              <a:t>Acceptance Criteria</a:t>
+              <a:t>Notes</a:t>
             </a:r>
           </a:p>
           <a:p>
@@ -7254,87 +7471,6 @@
               <a:buFont typeface="Arial" pitchFamily="34" charset="0"/>
               <a:buChar char="•"/>
             </a:pPr>
-            <a:r>
-              <a:rPr lang="en-AU" sz="2000" dirty="0" smtClean="0">
-                <a:solidFill>
-                  <a:schemeClr val="tx1"/>
-                </a:solidFill>
-              </a:rPr>
-              <a:t>Student can choose their preferred language from a dropdown menu at the top of a booking page.</a:t>
-            </a:r>
-          </a:p>
-          <a:p>
-            <a:pPr marL="179388" indent="-179388">
-              <a:buFont typeface="Arial" pitchFamily="34" charset="0"/>
-              <a:buChar char="•"/>
-            </a:pPr>
-            <a:r>
-              <a:rPr lang="en-AU" sz="2000" dirty="0" smtClean="0">
-                <a:solidFill>
-                  <a:schemeClr val="tx1"/>
-                </a:solidFill>
-              </a:rPr>
-              <a:t>This filters out which teacher speaks the selected language and displays the lessons times the student can select. </a:t>
-            </a:r>
-          </a:p>
-        </p:txBody>
-      </p:sp>
-      <p:sp>
-        <p:nvSpPr>
-          <p:cNvPr id="11" name="Rectangle 10"/>
-          <p:cNvSpPr/>
-          <p:nvPr/>
-        </p:nvSpPr>
-        <p:spPr>
-          <a:xfrm>
-            <a:off x="9147153" y="109410"/>
-            <a:ext cx="720000" cy="540000"/>
-          </a:xfrm>
-          <a:prstGeom prst="rect">
-            <a:avLst/>
-          </a:prstGeom>
-          <a:solidFill>
-            <a:srgbClr val="CCF0CD">
-              <a:alpha val="20000"/>
-            </a:srgbClr>
-          </a:solidFill>
-          <a:ln>
-            <a:solidFill>
-              <a:schemeClr val="accent1">
-                <a:lumMod val="50000"/>
-              </a:schemeClr>
-            </a:solidFill>
-          </a:ln>
-        </p:spPr>
-        <p:style>
-          <a:lnRef idx="2">
-            <a:schemeClr val="accent1">
-              <a:shade val="50000"/>
-            </a:schemeClr>
-          </a:lnRef>
-          <a:fillRef idx="1">
-            <a:schemeClr val="accent1"/>
-          </a:fillRef>
-          <a:effectRef idx="0">
-            <a:schemeClr val="accent1"/>
-          </a:effectRef>
-          <a:fontRef idx="minor">
-            <a:schemeClr val="lt1"/>
-          </a:fontRef>
-        </p:style>
-        <p:txBody>
-          <a:bodyPr wrap="square" lIns="0" rIns="0" rtlCol="0" anchor="ctr"/>
-          <a:lstStyle/>
-          <a:p>
-            <a:pPr algn="ctr"/>
-            <a:r>
-              <a:rPr lang="en-AU" sz="2000" dirty="0" smtClean="0">
-                <a:solidFill>
-                  <a:schemeClr val="tx1"/>
-                </a:solidFill>
-              </a:rPr>
-              <a:t>2.5</a:t>
-            </a:r>
             <a:endParaRPr lang="en-AU" sz="2000" dirty="0">
               <a:solidFill>
                 <a:schemeClr val="tx1"/>
@@ -7343,167 +7479,10 @@
           </a:p>
         </p:txBody>
       </p:sp>
-      <p:sp>
-        <p:nvSpPr>
-          <p:cNvPr id="12" name="Rectangle 11"/>
-          <p:cNvSpPr/>
-          <p:nvPr/>
-        </p:nvSpPr>
-        <p:spPr>
-          <a:xfrm>
-            <a:off x="8283153" y="109410"/>
-            <a:ext cx="792000" cy="540000"/>
-          </a:xfrm>
-          <a:prstGeom prst="rect">
-            <a:avLst/>
-          </a:prstGeom>
-          <a:solidFill>
-            <a:schemeClr val="accent4">
-              <a:lumMod val="20000"/>
-              <a:lumOff val="80000"/>
-            </a:schemeClr>
-          </a:solidFill>
-          <a:ln>
-            <a:solidFill>
-              <a:schemeClr val="accent1">
-                <a:lumMod val="50000"/>
-              </a:schemeClr>
-            </a:solidFill>
-          </a:ln>
-        </p:spPr>
-        <p:style>
-          <a:lnRef idx="2">
-            <a:schemeClr val="accent1">
-              <a:shade val="50000"/>
-            </a:schemeClr>
-          </a:lnRef>
-          <a:fillRef idx="1">
-            <a:schemeClr val="accent1"/>
-          </a:fillRef>
-          <a:effectRef idx="0">
-            <a:schemeClr val="accent1"/>
-          </a:effectRef>
-          <a:fontRef idx="minor">
-            <a:schemeClr val="lt1"/>
-          </a:fontRef>
-        </p:style>
-        <p:txBody>
-          <a:bodyPr wrap="none" lIns="0" rIns="0" rtlCol="0" anchor="ctr"/>
-          <a:lstStyle/>
-          <a:p>
-            <a:pPr algn="ctr"/>
-            <a:r>
-              <a:rPr lang="en-AU" sz="2000" dirty="0">
-                <a:solidFill>
-                  <a:schemeClr val="tx1"/>
-                </a:solidFill>
-              </a:rPr>
-              <a:t>S</a:t>
-            </a:r>
-          </a:p>
-        </p:txBody>
-      </p:sp>
-      <p:sp>
-        <p:nvSpPr>
-          <p:cNvPr id="13" name="Rectangle 12"/>
-          <p:cNvSpPr/>
-          <p:nvPr/>
-        </p:nvSpPr>
-        <p:spPr>
-          <a:xfrm>
-            <a:off x="39153" y="5128590"/>
-            <a:ext cx="9828000" cy="1620000"/>
-          </a:xfrm>
-          <a:prstGeom prst="rect">
-            <a:avLst/>
-          </a:prstGeom>
-          <a:solidFill>
-            <a:schemeClr val="bg1"/>
-          </a:solidFill>
-          <a:ln>
-            <a:solidFill>
-              <a:schemeClr val="accent1">
-                <a:lumMod val="50000"/>
-              </a:schemeClr>
-            </a:solidFill>
-          </a:ln>
-        </p:spPr>
-        <p:style>
-          <a:lnRef idx="2">
-            <a:schemeClr val="accent1">
-              <a:shade val="50000"/>
-            </a:schemeClr>
-          </a:lnRef>
-          <a:fillRef idx="1">
-            <a:schemeClr val="accent1"/>
-          </a:fillRef>
-          <a:effectRef idx="0">
-            <a:schemeClr val="accent1"/>
-          </a:effectRef>
-          <a:fontRef idx="minor">
-            <a:schemeClr val="lt1"/>
-          </a:fontRef>
-        </p:style>
-        <p:txBody>
-          <a:bodyPr tIns="36000" rtlCol="0" anchor="t" anchorCtr="0"/>
-          <a:lstStyle/>
-          <a:p>
-            <a:r>
-              <a:rPr lang="en-AU" sz="2000" dirty="0" smtClean="0">
-                <a:solidFill>
-                  <a:schemeClr val="tx1"/>
-                </a:solidFill>
-              </a:rPr>
-              <a:t>Notes</a:t>
-            </a:r>
-          </a:p>
-          <a:p>
-            <a:pPr marL="179388" indent="-179388">
-              <a:buFont typeface="Arial" pitchFamily="34" charset="0"/>
-              <a:buChar char="•"/>
-            </a:pPr>
-            <a:r>
-              <a:rPr lang="en-AU" sz="2000" dirty="0">
-                <a:solidFill>
-                  <a:schemeClr val="tx1"/>
-                </a:solidFill>
-              </a:rPr>
-              <a:t>A</a:t>
-            </a:r>
-            <a:r>
-              <a:rPr lang="en-AU" sz="2000" dirty="0" smtClean="0">
-                <a:solidFill>
-                  <a:schemeClr val="tx1"/>
-                </a:solidFill>
-              </a:rPr>
-              <a:t>ll customers can request for a speaking different language. </a:t>
-            </a:r>
-          </a:p>
-          <a:p>
-            <a:pPr marL="179388" indent="-179388">
-              <a:buFont typeface="Arial" pitchFamily="34" charset="0"/>
-              <a:buChar char="•"/>
-            </a:pPr>
-            <a:r>
-              <a:rPr lang="en-AU" sz="2000" dirty="0" smtClean="0">
-                <a:solidFill>
-                  <a:schemeClr val="tx1"/>
-                </a:solidFill>
-              </a:rPr>
-              <a:t>Not every language can be offered. Subject to teacher’s knowledge. </a:t>
-            </a:r>
-            <a:endParaRPr lang="en-AU" sz="2000" dirty="0">
-              <a:solidFill>
-                <a:schemeClr val="tx1"/>
-              </a:solidFill>
-            </a:endParaRPr>
-          </a:p>
-        </p:txBody>
-      </p:sp>
     </p:spTree>
     <p:extLst>
       <p:ext uri="{BB962C8B-B14F-4D97-AF65-F5344CB8AC3E}">
-        <p14:creationId xmlns:p14="http://schemas.microsoft.com/office/powerpoint/2010/main" val="81476069"/>
+        <p14:creationId xmlns:p14="http://schemas.microsoft.com/office/powerpoint/2010/main" val="133043708"/>
       </p:ext>
     </p:extLst>
   </p:cSld>
@@ -7593,8 +7572,13 @@
                   <a:schemeClr val="tx1"/>
                 </a:solidFill>
               </a:rPr>
-              <a:t>17</a:t>
-            </a:r>
+              <a:t>18</a:t>
+            </a:r>
+            <a:endParaRPr lang="en-AU" sz="2000" dirty="0">
+              <a:solidFill>
+                <a:schemeClr val="tx1"/>
+              </a:solidFill>
+            </a:endParaRPr>
           </a:p>
         </p:txBody>
       </p:sp>
@@ -7643,7 +7627,7 @@
             <a:pPr algn="ctr"/>
             <a:r>
               <a:rPr lang="en-AU" sz="2800" dirty="0" smtClean="0"/>
-              <a:t>Customer review</a:t>
+              <a:t>Reaching out</a:t>
             </a:r>
             <a:endParaRPr lang="en-AU" sz="2800" dirty="0"/>
           </a:p>
@@ -7707,7 +7691,7 @@
                   <a:schemeClr val="tx1"/>
                 </a:solidFill>
               </a:rPr>
-              <a:t>As the </a:t>
+              <a:t>As the owner of the music school I would like to be able to tell people about my school so that I can broaden my outreach to potential teachers and </a:t>
             </a:r>
             <a:r>
               <a:rPr lang="en-US" sz="2400" dirty="0" smtClean="0">
@@ -7715,15 +7699,7 @@
                   <a:schemeClr val="tx1"/>
                 </a:solidFill>
               </a:rPr>
-              <a:t>owner, I want the public to see past and current student’s comments on the school and their experience so that I can </a:t>
-            </a:r>
-            <a:r>
-              <a:rPr lang="en-AU" sz="2400" dirty="0" smtClean="0">
-                <a:solidFill>
-                  <a:schemeClr val="tx1"/>
-                </a:solidFill>
-              </a:rPr>
-              <a:t>get more students to join and build a bigger community. </a:t>
+              <a:t>students.</a:t>
             </a:r>
             <a:endParaRPr lang="en-AU" sz="2400" dirty="0">
               <a:solidFill>
@@ -7801,7 +7777,7 @@
                   <a:schemeClr val="tx1"/>
                 </a:solidFill>
               </a:rPr>
-              <a:t>Have a page showing people’s experience and reviews.</a:t>
+              <a:t>Website is linked to a business’ Facebook page.</a:t>
             </a:r>
           </a:p>
           <a:p>
@@ -7815,7 +7791,7 @@
                   <a:schemeClr val="tx1"/>
                 </a:solidFill>
               </a:rPr>
-              <a:t>Have a review button to pull up a form to submit to the website.</a:t>
+              <a:t>Website shared to others by a share button on the bottom of the page. </a:t>
             </a:r>
           </a:p>
         </p:txBody>
@@ -7874,7 +7850,7 @@
                   <a:schemeClr val="tx1"/>
                 </a:solidFill>
               </a:rPr>
-              <a:t>2</a:t>
+              <a:t>1</a:t>
             </a:r>
             <a:endParaRPr lang="en-AU" sz="2000" dirty="0">
               <a:solidFill>
@@ -8014,7 +7990,7 @@
     </p:spTree>
     <p:extLst>
       <p:ext uri="{BB962C8B-B14F-4D97-AF65-F5344CB8AC3E}">
-        <p14:creationId xmlns:p14="http://schemas.microsoft.com/office/powerpoint/2010/main" val="133043708"/>
+        <p14:creationId xmlns:p14="http://schemas.microsoft.com/office/powerpoint/2010/main" val="567883399"/>
       </p:ext>
     </p:extLst>
   </p:cSld>
@@ -8096,15 +8072,15 @@
                   <a:schemeClr val="tx1"/>
                 </a:solidFill>
               </a:rPr>
-              <a:t>Story ID: </a:t>
-            </a:r>
-            <a:r>
-              <a:rPr lang="en-AU" sz="2000" dirty="0" smtClean="0">
-                <a:solidFill>
-                  <a:schemeClr val="tx1"/>
-                </a:solidFill>
-              </a:rPr>
-              <a:t>18</a:t>
+              <a:t>Story ID</a:t>
+            </a:r>
+            <a:r>
+              <a:rPr lang="en-AU" sz="2000" dirty="0" smtClean="0">
+                <a:solidFill>
+                  <a:schemeClr val="tx1"/>
+                </a:solidFill>
+              </a:rPr>
+              <a:t>: 19</a:t>
             </a:r>
             <a:endParaRPr lang="en-AU" sz="2000" dirty="0">
               <a:solidFill>
@@ -8159,7 +8135,7 @@
             <a:pPr algn="ctr"/>
             <a:r>
               <a:rPr lang="en-AU" sz="2800" dirty="0" smtClean="0"/>
-              <a:t>Reaching out</a:t>
+              <a:t>Development feedback</a:t>
             </a:r>
             <a:endParaRPr lang="en-AU" sz="2800" dirty="0"/>
           </a:p>
@@ -8223,15 +8199,7 @@
                   <a:schemeClr val="tx1"/>
                 </a:solidFill>
               </a:rPr>
-              <a:t>As the owner of the music school I would like to be able to tell people about my school so that I can broaden my outreach to potential teachers and </a:t>
-            </a:r>
-            <a:r>
-              <a:rPr lang="en-US" sz="2400" dirty="0" smtClean="0">
-                <a:solidFill>
-                  <a:schemeClr val="tx1"/>
-                </a:solidFill>
-              </a:rPr>
-              <a:t>students.</a:t>
+              <a:t>As a developer, I would like feedback from clients during the development stage so I can make informed decisions on the website design. </a:t>
             </a:r>
             <a:endParaRPr lang="en-AU" sz="2400" dirty="0">
               <a:solidFill>
@@ -8309,7 +8277,7 @@
                   <a:schemeClr val="tx1"/>
                 </a:solidFill>
               </a:rPr>
-              <a:t>Website is linked to a business’ Facebook page.</a:t>
+              <a:t>Client able to send feedback through the website. </a:t>
             </a:r>
           </a:p>
           <a:p>
@@ -8323,7 +8291,7 @@
                   <a:schemeClr val="tx1"/>
                 </a:solidFill>
               </a:rPr>
-              <a:t>Website shared to others by a share button on the bottom of the page. </a:t>
+              <a:t>Feedback button to be seen on the website through development. </a:t>
             </a:r>
           </a:p>
         </p:txBody>
@@ -8377,18 +8345,13 @@
           <a:p>
             <a:pPr algn="ctr"/>
             <a:r>
-              <a:rPr lang="en-AU" sz="2000" dirty="0" smtClean="0">
-                <a:solidFill>
-                  <a:schemeClr val="tx1"/>
-                </a:solidFill>
-              </a:rPr>
-              <a:t>1</a:t>
-            </a:r>
-            <a:endParaRPr lang="en-AU" sz="2000" dirty="0">
-              <a:solidFill>
-                <a:schemeClr val="tx1"/>
-              </a:solidFill>
-            </a:endParaRPr>
+              <a:rPr lang="en-AU" sz="2000" dirty="0">
+                <a:solidFill>
+                  <a:schemeClr val="tx1"/>
+                </a:solidFill>
+              </a:rPr>
+              <a:t>2</a:t>
+            </a:r>
           </a:p>
         </p:txBody>
       </p:sp>
@@ -8447,7 +8410,7 @@
                   <a:schemeClr val="tx1"/>
                 </a:solidFill>
               </a:rPr>
-              <a:t>C</a:t>
+              <a:t>W</a:t>
             </a:r>
           </a:p>
         </p:txBody>
@@ -8507,22 +8470,21 @@
             </a:r>
           </a:p>
           <a:p>
-            <a:pPr marL="179388" indent="-179388">
-              <a:buFont typeface="Arial" pitchFamily="34" charset="0"/>
-              <a:buChar char="•"/>
-            </a:pPr>
-            <a:endParaRPr lang="en-AU" sz="2000" dirty="0">
-              <a:solidFill>
-                <a:schemeClr val="tx1"/>
-              </a:solidFill>
-            </a:endParaRPr>
+            <a:r>
+              <a:rPr lang="en-AU" sz="2000" dirty="0" smtClean="0">
+                <a:solidFill>
+                  <a:schemeClr val="tx1"/>
+                </a:solidFill>
+              </a:rPr>
+              <a:t>Developers aren’t users of the website</a:t>
+            </a:r>
           </a:p>
         </p:txBody>
       </p:sp>
     </p:spTree>
     <p:extLst>
       <p:ext uri="{BB962C8B-B14F-4D97-AF65-F5344CB8AC3E}">
-        <p14:creationId xmlns:p14="http://schemas.microsoft.com/office/powerpoint/2010/main" val="567883399"/>
+        <p14:creationId xmlns:p14="http://schemas.microsoft.com/office/powerpoint/2010/main" val="863874356"/>
       </p:ext>
     </p:extLst>
   </p:cSld>
@@ -9152,23 +9114,15 @@
                   <a:schemeClr val="tx1"/>
                 </a:solidFill>
               </a:rPr>
-              <a:t>Story ID</a:t>
-            </a:r>
-            <a:r>
-              <a:rPr lang="en-AU" sz="2000" dirty="0" smtClean="0">
-                <a:solidFill>
-                  <a:schemeClr val="tx1"/>
-                </a:solidFill>
-              </a:rPr>
-              <a:t>: </a:t>
-            </a:r>
-            <a:r>
-              <a:rPr lang="en-AU" sz="2000" dirty="0" smtClean="0">
-                <a:solidFill>
-                  <a:schemeClr val="tx1"/>
-                </a:solidFill>
-              </a:rPr>
-              <a:t>19</a:t>
+              <a:t>Story ID: </a:t>
+            </a:r>
+            <a:r>
+              <a:rPr lang="en-AU" sz="2000" dirty="0" smtClean="0">
+                <a:solidFill>
+                  <a:schemeClr val="tx1"/>
+                </a:solidFill>
+              </a:rPr>
+              <a:t>20</a:t>
             </a:r>
             <a:endParaRPr lang="en-AU" sz="2000" dirty="0">
               <a:solidFill>
@@ -9223,7 +9177,7 @@
             <a:pPr algn="ctr"/>
             <a:r>
               <a:rPr lang="en-AU" sz="2800" dirty="0" smtClean="0"/>
-              <a:t>Development feedback</a:t>
+              <a:t>Planned leave</a:t>
             </a:r>
             <a:endParaRPr lang="en-AU" sz="2800" dirty="0"/>
           </a:p>
@@ -9276,82 +9230,92 @@
         <p:txBody>
           <a:bodyPr rtlCol="0" anchor="t" anchorCtr="0"/>
           <a:lstStyle/>
+          <a:p>
+            <a:r>
+              <a:rPr lang="en-US" sz="2400" dirty="0" smtClean="0">
+                <a:solidFill>
+                  <a:schemeClr val="tx1"/>
+                </a:solidFill>
+              </a:rPr>
+              <a:t>As a teacher, I want to be able to spend some time off so I can relax and come back to the job refreshed. </a:t>
+            </a:r>
+            <a:endParaRPr lang="en-AU" sz="2400" dirty="0" smtClean="0">
+              <a:solidFill>
+                <a:schemeClr val="tx1"/>
+              </a:solidFill>
+            </a:endParaRPr>
+          </a:p>
+        </p:txBody>
+      </p:sp>
+      <p:sp>
+        <p:nvSpPr>
+          <p:cNvPr id="8" name="Rectangle 7"/>
+          <p:cNvSpPr/>
+          <p:nvPr/>
+        </p:nvSpPr>
+        <p:spPr>
+          <a:xfrm>
+            <a:off x="39153" y="3335530"/>
+            <a:ext cx="9828000" cy="1620000"/>
+          </a:xfrm>
+          <a:prstGeom prst="rect">
+            <a:avLst/>
+          </a:prstGeom>
+          <a:solidFill>
+            <a:schemeClr val="accent1">
+              <a:lumMod val="20000"/>
+              <a:lumOff val="80000"/>
+            </a:schemeClr>
+          </a:solidFill>
+          <a:ln>
+            <a:solidFill>
+              <a:schemeClr val="accent1">
+                <a:lumMod val="50000"/>
+              </a:schemeClr>
+            </a:solidFill>
+          </a:ln>
+        </p:spPr>
+        <p:style>
+          <a:lnRef idx="2">
+            <a:schemeClr val="accent1">
+              <a:shade val="50000"/>
+            </a:schemeClr>
+          </a:lnRef>
+          <a:fillRef idx="1">
+            <a:schemeClr val="accent1"/>
+          </a:fillRef>
+          <a:effectRef idx="0">
+            <a:schemeClr val="accent1"/>
+          </a:effectRef>
+          <a:fontRef idx="minor">
+            <a:schemeClr val="lt1"/>
+          </a:fontRef>
+        </p:style>
+        <p:txBody>
+          <a:bodyPr tIns="36000" rtlCol="0" anchor="t" anchorCtr="0"/>
+          <a:lstStyle/>
+          <a:p>
+            <a:r>
+              <a:rPr lang="en-AU" sz="2000" dirty="0" smtClean="0">
+                <a:solidFill>
+                  <a:schemeClr val="tx1"/>
+                </a:solidFill>
+              </a:rPr>
+              <a:t>Acceptance Criteria</a:t>
+            </a:r>
+          </a:p>
           <a:p>
             <a:pPr marL="179388" indent="-179388">
               <a:buFont typeface="Arial" pitchFamily="34" charset="0"/>
               <a:buChar char="•"/>
             </a:pPr>
             <a:r>
-              <a:rPr lang="en-US" sz="2400" dirty="0">
-                <a:solidFill>
-                  <a:schemeClr val="tx1"/>
-                </a:solidFill>
-              </a:rPr>
-              <a:t>As a developer, I would like feedback from clients during the development stage so I can make informed decisions on the website design. </a:t>
-            </a:r>
-            <a:endParaRPr lang="en-AU" sz="2400" dirty="0">
-              <a:solidFill>
-                <a:schemeClr val="tx1"/>
-              </a:solidFill>
-            </a:endParaRPr>
-          </a:p>
-        </p:txBody>
-      </p:sp>
-      <p:sp>
-        <p:nvSpPr>
-          <p:cNvPr id="8" name="Rectangle 7"/>
-          <p:cNvSpPr/>
-          <p:nvPr/>
-        </p:nvSpPr>
-        <p:spPr>
-          <a:xfrm>
-            <a:off x="39153" y="3335530"/>
-            <a:ext cx="9828000" cy="1620000"/>
-          </a:xfrm>
-          <a:prstGeom prst="rect">
-            <a:avLst/>
-          </a:prstGeom>
-          <a:solidFill>
-            <a:schemeClr val="accent1">
-              <a:lumMod val="20000"/>
-              <a:lumOff val="80000"/>
-            </a:schemeClr>
-          </a:solidFill>
-          <a:ln>
-            <a:solidFill>
-              <a:schemeClr val="accent1">
-                <a:lumMod val="50000"/>
-              </a:schemeClr>
-            </a:solidFill>
-          </a:ln>
-        </p:spPr>
-        <p:style>
-          <a:lnRef idx="2">
-            <a:schemeClr val="accent1">
-              <a:shade val="50000"/>
-            </a:schemeClr>
-          </a:lnRef>
-          <a:fillRef idx="1">
-            <a:schemeClr val="accent1"/>
-          </a:fillRef>
-          <a:effectRef idx="0">
-            <a:schemeClr val="accent1"/>
-          </a:effectRef>
-          <a:fontRef idx="minor">
-            <a:schemeClr val="lt1"/>
-          </a:fontRef>
-        </p:style>
-        <p:txBody>
-          <a:bodyPr tIns="36000" rtlCol="0" anchor="t" anchorCtr="0"/>
-          <a:lstStyle/>
-          <a:p>
-            <a:r>
-              <a:rPr lang="en-AU" sz="2000" dirty="0" smtClean="0">
-                <a:solidFill>
-                  <a:schemeClr val="tx1"/>
-                </a:solidFill>
-              </a:rPr>
-              <a:t>Acceptance Criteria</a:t>
+              <a:rPr lang="en-AU" sz="2000" dirty="0" smtClean="0">
+                <a:solidFill>
+                  <a:schemeClr val="tx1"/>
+                </a:solidFill>
+              </a:rPr>
+              <a:t>Teachers can request time off using the ‘manage availability’ tab.</a:t>
             </a:r>
           </a:p>
           <a:p>
@@ -9365,7 +9329,7 @@
                   <a:schemeClr val="tx1"/>
                 </a:solidFill>
               </a:rPr>
-              <a:t>Client able to send feedback through the website. </a:t>
+              <a:t>Time off requests are sent to the owner.</a:t>
             </a:r>
           </a:p>
           <a:p>
@@ -9379,7 +9343,7 @@
                   <a:schemeClr val="tx1"/>
                 </a:solidFill>
               </a:rPr>
-              <a:t>Feedback button to be seen on the website through development. </a:t>
+              <a:t>Owner can review the request and approve it with an accept button. </a:t>
             </a:r>
           </a:p>
         </p:txBody>
@@ -9433,12 +9397,12 @@
           <a:p>
             <a:pPr algn="ctr"/>
             <a:r>
-              <a:rPr lang="en-AU" sz="2000" dirty="0">
-                <a:solidFill>
-                  <a:schemeClr val="tx1"/>
-                </a:solidFill>
-              </a:rPr>
-              <a:t>2</a:t>
+              <a:rPr lang="en-AU" sz="2000" dirty="0" smtClean="0">
+                <a:solidFill>
+                  <a:schemeClr val="tx1"/>
+                </a:solidFill>
+              </a:rPr>
+              <a:t>8</a:t>
             </a:r>
             <a:endParaRPr lang="en-AU" sz="2000" dirty="0">
               <a:solidFill>
@@ -9563,21 +9527,44 @@
             </a:r>
           </a:p>
           <a:p>
-            <a:r>
-              <a:rPr lang="en-AU" sz="2000" dirty="0" smtClean="0">
-                <a:solidFill>
-                  <a:schemeClr val="tx1"/>
-                </a:solidFill>
-              </a:rPr>
-              <a:t>Developers aren’t users of the website</a:t>
-            </a:r>
+            <a:pPr marL="179388" indent="-179388">
+              <a:buFont typeface="Arial" pitchFamily="34" charset="0"/>
+              <a:buChar char="•"/>
+            </a:pPr>
+            <a:r>
+              <a:rPr lang="en-AU" sz="2000" dirty="0" smtClean="0">
+                <a:solidFill>
+                  <a:schemeClr val="tx1"/>
+                </a:solidFill>
+              </a:rPr>
+              <a:t>Teacher must have enough hours accrued for the planned leave.</a:t>
+            </a:r>
+          </a:p>
+          <a:p>
+            <a:pPr marL="179388" indent="-179388">
+              <a:buFont typeface="Arial" pitchFamily="34" charset="0"/>
+              <a:buChar char="•"/>
+            </a:pPr>
+            <a:r>
+              <a:rPr lang="en-AU" sz="2000" dirty="0" smtClean="0">
+                <a:solidFill>
+                  <a:schemeClr val="tx1"/>
+                </a:solidFill>
+              </a:rPr>
+              <a:t>System records the hours the teacher has worked.  </a:t>
+            </a:r>
+            <a:endParaRPr lang="en-AU" sz="2000" dirty="0">
+              <a:solidFill>
+                <a:schemeClr val="tx1"/>
+              </a:solidFill>
+            </a:endParaRPr>
           </a:p>
         </p:txBody>
       </p:sp>
     </p:spTree>
     <p:extLst>
       <p:ext uri="{BB962C8B-B14F-4D97-AF65-F5344CB8AC3E}">
-        <p14:creationId xmlns:p14="http://schemas.microsoft.com/office/powerpoint/2010/main" val="863874356"/>
+        <p14:creationId xmlns:p14="http://schemas.microsoft.com/office/powerpoint/2010/main" val="652885945"/>
       </p:ext>
     </p:extLst>
   </p:cSld>
@@ -9659,15 +9646,15 @@
                   <a:schemeClr val="tx1"/>
                 </a:solidFill>
               </a:rPr>
-              <a:t>Story ID: </a:t>
-            </a:r>
-            <a:r>
-              <a:rPr lang="en-AU" sz="2000" dirty="0" smtClean="0">
-                <a:solidFill>
-                  <a:schemeClr val="tx1"/>
-                </a:solidFill>
-              </a:rPr>
-              <a:t>20</a:t>
+              <a:t>Story ID</a:t>
+            </a:r>
+            <a:r>
+              <a:rPr lang="en-AU" sz="2000" dirty="0" smtClean="0">
+                <a:solidFill>
+                  <a:schemeClr val="tx1"/>
+                </a:solidFill>
+              </a:rPr>
+              <a:t>: 21</a:t>
             </a:r>
             <a:endParaRPr lang="en-AU" sz="2000" dirty="0">
               <a:solidFill>
@@ -9722,7 +9709,7 @@
             <a:pPr algn="ctr"/>
             <a:r>
               <a:rPr lang="en-AU" sz="2800" dirty="0" smtClean="0"/>
-              <a:t>Planned leave</a:t>
+              <a:t>Development feedback</a:t>
             </a:r>
             <a:endParaRPr lang="en-AU" sz="2800" dirty="0"/>
           </a:p>
@@ -9776,15 +9763,19 @@
           <a:bodyPr rtlCol="0" anchor="t" anchorCtr="0"/>
           <a:lstStyle/>
           <a:p>
-            <a:r>
-              <a:rPr lang="en-US" sz="2400" dirty="0" smtClean="0">
-                <a:solidFill>
-                  <a:schemeClr val="tx1"/>
-                </a:solidFill>
-              </a:rPr>
-              <a:t>As a teacher, I want to be able to spend some time off so I can relax and come back to the job refreshed. </a:t>
-            </a:r>
-            <a:endParaRPr lang="en-AU" sz="2400" dirty="0" smtClean="0">
+            <a:pPr marL="179388" indent="-179388">
+              <a:buFont typeface="Arial" pitchFamily="34" charset="0"/>
+              <a:buChar char="•"/>
+            </a:pPr>
+            <a:r>
+              <a:rPr lang="en-US" sz="2400" dirty="0">
+                <a:solidFill>
+                  <a:schemeClr val="tx1"/>
+                </a:solidFill>
+              </a:rPr>
+              <a:t>as a receptionist, I would like to be able to book lessons so I can help set correct timetables for everyone and not cause confusion with the system</a:t>
+            </a:r>
+            <a:endParaRPr lang="en-AU" sz="2400" dirty="0">
               <a:solidFill>
                 <a:schemeClr val="tx1"/>
               </a:solidFill>
@@ -9860,35 +9851,7 @@
                   <a:schemeClr val="tx1"/>
                 </a:solidFill>
               </a:rPr>
-              <a:t>Teachers can request time off using the ‘manage availability’ tab.</a:t>
-            </a:r>
-          </a:p>
-          <a:p>
-            <a:pPr marL="179388" indent="-179388">
-              <a:buFont typeface="Arial" pitchFamily="34" charset="0"/>
-              <a:buChar char="•"/>
-            </a:pPr>
-            <a:r>
-              <a:rPr lang="en-AU" sz="2000" dirty="0" smtClean="0">
-                <a:solidFill>
-                  <a:schemeClr val="tx1"/>
-                </a:solidFill>
-              </a:rPr>
-              <a:t>Time off requests are sent to the owner.</a:t>
-            </a:r>
-          </a:p>
-          <a:p>
-            <a:pPr marL="179388" indent="-179388">
-              <a:buFont typeface="Arial" pitchFamily="34" charset="0"/>
-              <a:buChar char="•"/>
-            </a:pPr>
-            <a:r>
-              <a:rPr lang="en-AU" sz="2000" dirty="0" smtClean="0">
-                <a:solidFill>
-                  <a:schemeClr val="tx1"/>
-                </a:solidFill>
-              </a:rPr>
-              <a:t>Owner can review the request and approve it with an accept button. </a:t>
+              <a:t>Receptionist can manage bookings. </a:t>
             </a:r>
           </a:p>
         </p:txBody>
@@ -9942,18 +9905,13 @@
           <a:p>
             <a:pPr algn="ctr"/>
             <a:r>
-              <a:rPr lang="en-AU" sz="2000" dirty="0" smtClean="0">
-                <a:solidFill>
-                  <a:schemeClr val="tx1"/>
-                </a:solidFill>
-              </a:rPr>
-              <a:t>8</a:t>
-            </a:r>
-            <a:endParaRPr lang="en-AU" sz="2000" dirty="0">
-              <a:solidFill>
-                <a:schemeClr val="tx1"/>
-              </a:solidFill>
-            </a:endParaRPr>
+              <a:rPr lang="en-AU" sz="2000" dirty="0">
+                <a:solidFill>
+                  <a:schemeClr val="tx1"/>
+                </a:solidFill>
+              </a:rPr>
+              <a:t>2</a:t>
+            </a:r>
           </a:p>
         </p:txBody>
       </p:sp>
@@ -10072,44 +10030,31 @@
             </a:r>
           </a:p>
           <a:p>
-            <a:pPr marL="179388" indent="-179388">
-              <a:buFont typeface="Arial" pitchFamily="34" charset="0"/>
-              <a:buChar char="•"/>
-            </a:pPr>
-            <a:r>
-              <a:rPr lang="en-AU" sz="2000" dirty="0" smtClean="0">
-                <a:solidFill>
-                  <a:schemeClr val="tx1"/>
-                </a:solidFill>
-              </a:rPr>
-              <a:t>Teacher must have enough hours accrued for the planned leave.</a:t>
-            </a:r>
-          </a:p>
-          <a:p>
-            <a:pPr marL="179388" indent="-179388">
-              <a:buFont typeface="Arial" pitchFamily="34" charset="0"/>
-              <a:buChar char="•"/>
-            </a:pPr>
-            <a:r>
-              <a:rPr lang="en-AU" sz="2000" dirty="0" smtClean="0">
-                <a:solidFill>
-                  <a:schemeClr val="tx1"/>
-                </a:solidFill>
-              </a:rPr>
-              <a:t>System records the hours the teacher has worked.  </a:t>
-            </a:r>
-            <a:endParaRPr lang="en-AU" sz="2000" dirty="0">
-              <a:solidFill>
-                <a:schemeClr val="tx1"/>
-              </a:solidFill>
-            </a:endParaRPr>
+            <a:r>
+              <a:rPr lang="en-AU" sz="2000" dirty="0" smtClean="0">
+                <a:solidFill>
+                  <a:schemeClr val="tx1"/>
+                </a:solidFill>
+              </a:rPr>
+              <a:t>Not much of a role, can cost lots of money to have a receptionist </a:t>
+            </a:r>
+          </a:p>
+          <a:p>
+            <a:r>
+              <a:rPr lang="en-AU" sz="2000" dirty="0" smtClean="0">
+                <a:solidFill>
+                  <a:schemeClr val="tx1"/>
+                </a:solidFill>
+              </a:rPr>
+              <a:t>Owner will play the receptionist role</a:t>
+            </a:r>
           </a:p>
         </p:txBody>
       </p:sp>
     </p:spTree>
     <p:extLst>
       <p:ext uri="{BB962C8B-B14F-4D97-AF65-F5344CB8AC3E}">
-        <p14:creationId xmlns:p14="http://schemas.microsoft.com/office/powerpoint/2010/main" val="652885945"/>
+        <p14:creationId xmlns:p14="http://schemas.microsoft.com/office/powerpoint/2010/main" val="1910129001"/>
       </p:ext>
     </p:extLst>
   </p:cSld>
@@ -10199,7 +10144,7 @@
                   <a:schemeClr val="tx1"/>
                 </a:solidFill>
               </a:rPr>
-              <a:t>: 21</a:t>
+              <a:t>: 22</a:t>
             </a:r>
             <a:endParaRPr lang="en-AU" sz="2000" dirty="0">
               <a:solidFill>
@@ -10254,7 +10199,7 @@
             <a:pPr algn="ctr"/>
             <a:r>
               <a:rPr lang="en-AU" sz="2800" dirty="0" smtClean="0"/>
-              <a:t>Development feedback</a:t>
+              <a:t>Suspending accounts</a:t>
             </a:r>
             <a:endParaRPr lang="en-AU" sz="2800" dirty="0"/>
           </a:p>
@@ -10318,8 +10263,15 @@
                   <a:schemeClr val="tx1"/>
                 </a:solidFill>
               </a:rPr>
-              <a:t>as a receptionist, I would like to be able to book lessons so I can help set correct timetables for everyone and not cause confusion with the system</a:t>
-            </a:r>
+              <a:t>As the owner, I want to be able to suspend teacher accounts with a button so that they won’t leak sensitive information like student/staff information, accounts or documents after they leave the business. </a:t>
+            </a:r>
+            <a:br>
+              <a:rPr lang="en-US" sz="2400" dirty="0">
+                <a:solidFill>
+                  <a:schemeClr val="tx1"/>
+                </a:solidFill>
+              </a:rPr>
+            </a:br>
             <a:endParaRPr lang="en-AU" sz="2400" dirty="0">
               <a:solidFill>
                 <a:schemeClr val="tx1"/>
@@ -10396,7 +10348,7 @@
                   <a:schemeClr val="tx1"/>
                 </a:solidFill>
               </a:rPr>
-              <a:t>Receptionist can manage bookings. </a:t>
+              <a:t> Admin deletes an account with one button. </a:t>
             </a:r>
           </a:p>
         </p:txBody>
@@ -10450,7 +10402,7 @@
           <a:p>
             <a:pPr algn="ctr"/>
             <a:r>
-              <a:rPr lang="en-AU" sz="2000" dirty="0">
+              <a:rPr lang="en-AU" sz="2000" dirty="0" smtClean="0">
                 <a:solidFill>
                   <a:schemeClr val="tx1"/>
                 </a:solidFill>
@@ -10580,31 +10532,30 @@
             </a:r>
           </a:p>
           <a:p>
-            <a:r>
-              <a:rPr lang="en-AU" sz="2000" dirty="0" smtClean="0">
-                <a:solidFill>
-                  <a:schemeClr val="tx1"/>
-                </a:solidFill>
-              </a:rPr>
-              <a:t>Not much of a role, can cost lots of money to have a receptionist </a:t>
-            </a:r>
-          </a:p>
-          <a:p>
-            <a:r>
-              <a:rPr lang="en-AU" sz="2000" dirty="0" smtClean="0">
-                <a:solidFill>
-                  <a:schemeClr val="tx1"/>
-                </a:solidFill>
-              </a:rPr>
-              <a:t>Owner will play the receptionist role</a:t>
-            </a:r>
+            <a:pPr marL="179388" indent="-179388">
+              <a:buFont typeface="Arial" pitchFamily="34" charset="0"/>
+              <a:buChar char="•"/>
+            </a:pPr>
+            <a:r>
+              <a:rPr lang="en-AU" sz="2000" dirty="0" smtClean="0">
+                <a:solidFill>
+                  <a:schemeClr val="tx1"/>
+                </a:solidFill>
+              </a:rPr>
+              <a:t>Similar story to story id 3</a:t>
+            </a:r>
+            <a:endParaRPr lang="en-AU" sz="2000" dirty="0">
+              <a:solidFill>
+                <a:schemeClr val="tx1"/>
+              </a:solidFill>
+            </a:endParaRPr>
           </a:p>
         </p:txBody>
       </p:sp>
     </p:spTree>
     <p:extLst>
       <p:ext uri="{BB962C8B-B14F-4D97-AF65-F5344CB8AC3E}">
-        <p14:creationId xmlns:p14="http://schemas.microsoft.com/office/powerpoint/2010/main" val="1910129001"/>
+        <p14:creationId xmlns:p14="http://schemas.microsoft.com/office/powerpoint/2010/main" val="997612583"/>
       </p:ext>
     </p:extLst>
   </p:cSld>
@@ -10694,7 +10645,7 @@
                   <a:schemeClr val="tx1"/>
                 </a:solidFill>
               </a:rPr>
-              <a:t>: 22</a:t>
+              <a:t>: 23</a:t>
             </a:r>
             <a:endParaRPr lang="en-AU" sz="2000" dirty="0">
               <a:solidFill>
@@ -10749,7 +10700,7 @@
             <a:pPr algn="ctr"/>
             <a:r>
               <a:rPr lang="en-AU" sz="2800" dirty="0" smtClean="0"/>
-              <a:t>Suspending accounts</a:t>
+              <a:t>Client Meetings</a:t>
             </a:r>
             <a:endParaRPr lang="en-AU" sz="2800" dirty="0"/>
           </a:p>
@@ -10813,15 +10764,8 @@
                   <a:schemeClr val="tx1"/>
                 </a:solidFill>
               </a:rPr>
-              <a:t>As the owner, I want to be able to suspend teacher accounts with a button so that they won’t leak sensitive information like student/staff information, accounts or documents after they leave the business. </a:t>
-            </a:r>
-            <a:br>
-              <a:rPr lang="en-US" sz="2400" dirty="0">
-                <a:solidFill>
-                  <a:schemeClr val="tx1"/>
-                </a:solidFill>
-              </a:rPr>
-            </a:br>
+              <a:t>As a developer I want access to the client once a week for progress and verification meetings as the project progresses. </a:t>
+            </a:r>
             <a:endParaRPr lang="en-AU" sz="2400" dirty="0">
               <a:solidFill>
                 <a:schemeClr val="tx1"/>
@@ -10898,7 +10842,21 @@
                   <a:schemeClr val="tx1"/>
                 </a:solidFill>
               </a:rPr>
-              <a:t> Admin deletes an account with one button. </a:t>
+              <a:t>Client to have access to website 24/7 to keep updated on it’s progress.</a:t>
+            </a:r>
+          </a:p>
+          <a:p>
+            <a:pPr marL="179388" indent="-179388">
+              <a:buFont typeface="Arial" pitchFamily="34" charset="0"/>
+              <a:buChar char="•"/>
+            </a:pPr>
+            <a:r>
+              <a:rPr lang="en-AU" sz="2000" dirty="0" smtClean="0">
+                <a:solidFill>
+                  <a:schemeClr val="tx1"/>
+                </a:solidFill>
+              </a:rPr>
+              <a:t>Client to be contactable.</a:t>
             </a:r>
           </a:p>
         </p:txBody>
@@ -10957,7 +10915,7 @@
                   <a:schemeClr val="tx1"/>
                 </a:solidFill>
               </a:rPr>
-              <a:t>2</a:t>
+              <a:t>1</a:t>
             </a:r>
             <a:endParaRPr lang="en-AU" sz="2000" dirty="0">
               <a:solidFill>
@@ -11082,30 +11040,21 @@
             </a:r>
           </a:p>
           <a:p>
-            <a:pPr marL="179388" indent="-179388">
-              <a:buFont typeface="Arial" pitchFamily="34" charset="0"/>
-              <a:buChar char="•"/>
-            </a:pPr>
-            <a:r>
-              <a:rPr lang="en-AU" sz="2000" dirty="0" smtClean="0">
-                <a:solidFill>
-                  <a:schemeClr val="tx1"/>
-                </a:solidFill>
-              </a:rPr>
-              <a:t>Similar story to story id 3</a:t>
-            </a:r>
-            <a:endParaRPr lang="en-AU" sz="2000" dirty="0">
-              <a:solidFill>
-                <a:schemeClr val="tx1"/>
-              </a:solidFill>
-            </a:endParaRPr>
+            <a:r>
+              <a:rPr lang="en-AU" sz="2000" dirty="0" smtClean="0">
+                <a:solidFill>
+                  <a:schemeClr val="tx1"/>
+                </a:solidFill>
+              </a:rPr>
+              <a:t>Developer aren’t users of the website. </a:t>
+            </a:r>
           </a:p>
         </p:txBody>
       </p:sp>
     </p:spTree>
     <p:extLst>
       <p:ext uri="{BB962C8B-B14F-4D97-AF65-F5344CB8AC3E}">
-        <p14:creationId xmlns:p14="http://schemas.microsoft.com/office/powerpoint/2010/main" val="997612583"/>
+        <p14:creationId xmlns:p14="http://schemas.microsoft.com/office/powerpoint/2010/main" val="596104827"/>
       </p:ext>
     </p:extLst>
   </p:cSld>
@@ -11195,7 +11144,7 @@
                   <a:schemeClr val="tx1"/>
                 </a:solidFill>
               </a:rPr>
-              <a:t>: 23</a:t>
+              <a:t>: 24</a:t>
             </a:r>
             <a:endParaRPr lang="en-AU" sz="2000" dirty="0">
               <a:solidFill>
@@ -11250,7 +11199,7 @@
             <a:pPr algn="ctr"/>
             <a:r>
               <a:rPr lang="en-AU" sz="2800" dirty="0" smtClean="0"/>
-              <a:t>Client Meetings</a:t>
+              <a:t>Updated software</a:t>
             </a:r>
             <a:endParaRPr lang="en-AU" sz="2800" dirty="0"/>
           </a:p>
@@ -11314,7 +11263,7 @@
                   <a:schemeClr val="tx1"/>
                 </a:solidFill>
               </a:rPr>
-              <a:t>As a developer I want access to the client once a week for progress and verification meetings as the project progresses. </a:t>
+              <a:t>As a developer I want to have all up to date software packages so that the project won't have version or crash issues.</a:t>
             </a:r>
             <a:endParaRPr lang="en-AU" sz="2400" dirty="0">
               <a:solidFill>
@@ -11392,7 +11341,7 @@
                   <a:schemeClr val="tx1"/>
                 </a:solidFill>
               </a:rPr>
-              <a:t>Client to have access to website 24/7 to keep updated on it’s progress.</a:t>
+              <a:t>Software to be updated everyday if new version is available.</a:t>
             </a:r>
           </a:p>
           <a:p>
@@ -11406,7 +11355,7 @@
                   <a:schemeClr val="tx1"/>
                 </a:solidFill>
               </a:rPr>
-              <a:t>Client to be contactable.</a:t>
+              <a:t>Programming languages should still be the same.</a:t>
             </a:r>
           </a:p>
         </p:txBody>
@@ -11465,7 +11414,7 @@
                   <a:schemeClr val="tx1"/>
                 </a:solidFill>
               </a:rPr>
-              <a:t>1</a:t>
+              <a:t>0.5</a:t>
             </a:r>
             <a:endParaRPr lang="en-AU" sz="2000" dirty="0">
               <a:solidFill>
@@ -11596,7 +11545,7 @@
                   <a:schemeClr val="tx1"/>
                 </a:solidFill>
               </a:rPr>
-              <a:t>Developer aren’t users of the website. </a:t>
+              <a:t>Developers aren’t users of the website</a:t>
             </a:r>
           </a:p>
         </p:txBody>
@@ -11604,7 +11553,7 @@
     </p:spTree>
     <p:extLst>
       <p:ext uri="{BB962C8B-B14F-4D97-AF65-F5344CB8AC3E}">
-        <p14:creationId xmlns:p14="http://schemas.microsoft.com/office/powerpoint/2010/main" val="596104827"/>
+        <p14:creationId xmlns:p14="http://schemas.microsoft.com/office/powerpoint/2010/main" val="219244569"/>
       </p:ext>
     </p:extLst>
   </p:cSld>
@@ -11686,505 +11635,6 @@
                   <a:schemeClr val="tx1"/>
                 </a:solidFill>
               </a:rPr>
-              <a:t>Story ID</a:t>
-            </a:r>
-            <a:r>
-              <a:rPr lang="en-AU" sz="2000" dirty="0" smtClean="0">
-                <a:solidFill>
-                  <a:schemeClr val="tx1"/>
-                </a:solidFill>
-              </a:rPr>
-              <a:t>: 24</a:t>
-            </a:r>
-            <a:endParaRPr lang="en-AU" sz="2000" dirty="0">
-              <a:solidFill>
-                <a:schemeClr val="tx1"/>
-              </a:solidFill>
-            </a:endParaRPr>
-          </a:p>
-        </p:txBody>
-      </p:sp>
-      <p:sp>
-        <p:nvSpPr>
-          <p:cNvPr id="6" name="Rectangle 5"/>
-          <p:cNvSpPr/>
-          <p:nvPr/>
-        </p:nvSpPr>
-        <p:spPr>
-          <a:xfrm>
-            <a:off x="831153" y="109410"/>
-            <a:ext cx="7380000" cy="540000"/>
-          </a:xfrm>
-          <a:prstGeom prst="rect">
-            <a:avLst/>
-          </a:prstGeom>
-          <a:ln>
-            <a:solidFill>
-              <a:schemeClr val="accent1">
-                <a:lumMod val="50000"/>
-              </a:schemeClr>
-            </a:solidFill>
-          </a:ln>
-        </p:spPr>
-        <p:style>
-          <a:lnRef idx="2">
-            <a:schemeClr val="accent1">
-              <a:shade val="50000"/>
-            </a:schemeClr>
-          </a:lnRef>
-          <a:fillRef idx="1">
-            <a:schemeClr val="accent1"/>
-          </a:fillRef>
-          <a:effectRef idx="0">
-            <a:schemeClr val="accent1"/>
-          </a:effectRef>
-          <a:fontRef idx="minor">
-            <a:schemeClr val="lt1"/>
-          </a:fontRef>
-        </p:style>
-        <p:txBody>
-          <a:bodyPr rtlCol="0" anchor="ctr"/>
-          <a:lstStyle/>
-          <a:p>
-            <a:pPr algn="ctr"/>
-            <a:r>
-              <a:rPr lang="en-AU" sz="2800" dirty="0" smtClean="0"/>
-              <a:t>Updated software</a:t>
-            </a:r>
-            <a:endParaRPr lang="en-AU" sz="2800" dirty="0"/>
-          </a:p>
-        </p:txBody>
-      </p:sp>
-      <p:sp>
-        <p:nvSpPr>
-          <p:cNvPr id="7" name="Rectangle 6"/>
-          <p:cNvSpPr/>
-          <p:nvPr/>
-        </p:nvSpPr>
-        <p:spPr>
-          <a:xfrm>
-            <a:off x="39153" y="822470"/>
-            <a:ext cx="9828000" cy="2340000"/>
-          </a:xfrm>
-          <a:prstGeom prst="rect">
-            <a:avLst/>
-          </a:prstGeom>
-          <a:solidFill>
-            <a:schemeClr val="tx2">
-              <a:lumMod val="20000"/>
-              <a:lumOff val="80000"/>
-            </a:schemeClr>
-          </a:solidFill>
-          <a:ln>
-            <a:solidFill>
-              <a:schemeClr val="accent1">
-                <a:lumMod val="50000"/>
-              </a:schemeClr>
-            </a:solidFill>
-          </a:ln>
-        </p:spPr>
-        <p:style>
-          <a:lnRef idx="2">
-            <a:schemeClr val="accent1">
-              <a:shade val="50000"/>
-            </a:schemeClr>
-          </a:lnRef>
-          <a:fillRef idx="1">
-            <a:schemeClr val="accent1"/>
-          </a:fillRef>
-          <a:effectRef idx="0">
-            <a:schemeClr val="accent1"/>
-          </a:effectRef>
-          <a:fontRef idx="minor">
-            <a:schemeClr val="lt1"/>
-          </a:fontRef>
-        </p:style>
-        <p:txBody>
-          <a:bodyPr rtlCol="0" anchor="t" anchorCtr="0"/>
-          <a:lstStyle/>
-          <a:p>
-            <a:pPr marL="179388" indent="-179388">
-              <a:buFont typeface="Arial" pitchFamily="34" charset="0"/>
-              <a:buChar char="•"/>
-            </a:pPr>
-            <a:r>
-              <a:rPr lang="en-US" sz="2400" dirty="0">
-                <a:solidFill>
-                  <a:schemeClr val="tx1"/>
-                </a:solidFill>
-              </a:rPr>
-              <a:t>As a developer I want to have all up to date software packages so that the project won't have version or crash issues.</a:t>
-            </a:r>
-            <a:endParaRPr lang="en-AU" sz="2400" dirty="0">
-              <a:solidFill>
-                <a:schemeClr val="tx1"/>
-              </a:solidFill>
-            </a:endParaRPr>
-          </a:p>
-        </p:txBody>
-      </p:sp>
-      <p:sp>
-        <p:nvSpPr>
-          <p:cNvPr id="8" name="Rectangle 7"/>
-          <p:cNvSpPr/>
-          <p:nvPr/>
-        </p:nvSpPr>
-        <p:spPr>
-          <a:xfrm>
-            <a:off x="39153" y="3335530"/>
-            <a:ext cx="9828000" cy="1620000"/>
-          </a:xfrm>
-          <a:prstGeom prst="rect">
-            <a:avLst/>
-          </a:prstGeom>
-          <a:solidFill>
-            <a:schemeClr val="accent1">
-              <a:lumMod val="20000"/>
-              <a:lumOff val="80000"/>
-            </a:schemeClr>
-          </a:solidFill>
-          <a:ln>
-            <a:solidFill>
-              <a:schemeClr val="accent1">
-                <a:lumMod val="50000"/>
-              </a:schemeClr>
-            </a:solidFill>
-          </a:ln>
-        </p:spPr>
-        <p:style>
-          <a:lnRef idx="2">
-            <a:schemeClr val="accent1">
-              <a:shade val="50000"/>
-            </a:schemeClr>
-          </a:lnRef>
-          <a:fillRef idx="1">
-            <a:schemeClr val="accent1"/>
-          </a:fillRef>
-          <a:effectRef idx="0">
-            <a:schemeClr val="accent1"/>
-          </a:effectRef>
-          <a:fontRef idx="minor">
-            <a:schemeClr val="lt1"/>
-          </a:fontRef>
-        </p:style>
-        <p:txBody>
-          <a:bodyPr tIns="36000" rtlCol="0" anchor="t" anchorCtr="0"/>
-          <a:lstStyle/>
-          <a:p>
-            <a:r>
-              <a:rPr lang="en-AU" sz="2000" dirty="0" smtClean="0">
-                <a:solidFill>
-                  <a:schemeClr val="tx1"/>
-                </a:solidFill>
-              </a:rPr>
-              <a:t>Acceptance Criteria</a:t>
-            </a:r>
-          </a:p>
-          <a:p>
-            <a:pPr marL="179388" indent="-179388">
-              <a:buFont typeface="Arial" pitchFamily="34" charset="0"/>
-              <a:buChar char="•"/>
-            </a:pPr>
-            <a:r>
-              <a:rPr lang="en-AU" sz="2000" dirty="0" smtClean="0">
-                <a:solidFill>
-                  <a:schemeClr val="tx1"/>
-                </a:solidFill>
-              </a:rPr>
-              <a:t>Software to be updated everyday if new version is available.</a:t>
-            </a:r>
-          </a:p>
-          <a:p>
-            <a:pPr marL="179388" indent="-179388">
-              <a:buFont typeface="Arial" pitchFamily="34" charset="0"/>
-              <a:buChar char="•"/>
-            </a:pPr>
-            <a:r>
-              <a:rPr lang="en-AU" sz="2000" dirty="0" smtClean="0">
-                <a:solidFill>
-                  <a:schemeClr val="tx1"/>
-                </a:solidFill>
-              </a:rPr>
-              <a:t>Programming languages should still be the same.</a:t>
-            </a:r>
-          </a:p>
-        </p:txBody>
-      </p:sp>
-      <p:sp>
-        <p:nvSpPr>
-          <p:cNvPr id="11" name="Rectangle 10"/>
-          <p:cNvSpPr/>
-          <p:nvPr/>
-        </p:nvSpPr>
-        <p:spPr>
-          <a:xfrm>
-            <a:off x="9147153" y="109410"/>
-            <a:ext cx="720000" cy="540000"/>
-          </a:xfrm>
-          <a:prstGeom prst="rect">
-            <a:avLst/>
-          </a:prstGeom>
-          <a:solidFill>
-            <a:srgbClr val="CCF0CD">
-              <a:alpha val="20000"/>
-            </a:srgbClr>
-          </a:solidFill>
-          <a:ln>
-            <a:solidFill>
-              <a:schemeClr val="accent1">
-                <a:lumMod val="50000"/>
-              </a:schemeClr>
-            </a:solidFill>
-          </a:ln>
-        </p:spPr>
-        <p:style>
-          <a:lnRef idx="2">
-            <a:schemeClr val="accent1">
-              <a:shade val="50000"/>
-            </a:schemeClr>
-          </a:lnRef>
-          <a:fillRef idx="1">
-            <a:schemeClr val="accent1"/>
-          </a:fillRef>
-          <a:effectRef idx="0">
-            <a:schemeClr val="accent1"/>
-          </a:effectRef>
-          <a:fontRef idx="minor">
-            <a:schemeClr val="lt1"/>
-          </a:fontRef>
-        </p:style>
-        <p:txBody>
-          <a:bodyPr wrap="square" lIns="0" rIns="0" rtlCol="0" anchor="ctr"/>
-          <a:lstStyle/>
-          <a:p>
-            <a:pPr algn="ctr"/>
-            <a:r>
-              <a:rPr lang="en-AU" sz="2000" dirty="0" smtClean="0">
-                <a:solidFill>
-                  <a:schemeClr val="tx1"/>
-                </a:solidFill>
-              </a:rPr>
-              <a:t>0.5</a:t>
-            </a:r>
-            <a:endParaRPr lang="en-AU" sz="2000" dirty="0">
-              <a:solidFill>
-                <a:schemeClr val="tx1"/>
-              </a:solidFill>
-            </a:endParaRPr>
-          </a:p>
-        </p:txBody>
-      </p:sp>
-      <p:sp>
-        <p:nvSpPr>
-          <p:cNvPr id="12" name="Rectangle 11"/>
-          <p:cNvSpPr/>
-          <p:nvPr/>
-        </p:nvSpPr>
-        <p:spPr>
-          <a:xfrm>
-            <a:off x="8283153" y="109410"/>
-            <a:ext cx="792000" cy="540000"/>
-          </a:xfrm>
-          <a:prstGeom prst="rect">
-            <a:avLst/>
-          </a:prstGeom>
-          <a:solidFill>
-            <a:schemeClr val="accent4">
-              <a:lumMod val="20000"/>
-              <a:lumOff val="80000"/>
-            </a:schemeClr>
-          </a:solidFill>
-          <a:ln>
-            <a:solidFill>
-              <a:schemeClr val="accent1">
-                <a:lumMod val="50000"/>
-              </a:schemeClr>
-            </a:solidFill>
-          </a:ln>
-        </p:spPr>
-        <p:style>
-          <a:lnRef idx="2">
-            <a:schemeClr val="accent1">
-              <a:shade val="50000"/>
-            </a:schemeClr>
-          </a:lnRef>
-          <a:fillRef idx="1">
-            <a:schemeClr val="accent1"/>
-          </a:fillRef>
-          <a:effectRef idx="0">
-            <a:schemeClr val="accent1"/>
-          </a:effectRef>
-          <a:fontRef idx="minor">
-            <a:schemeClr val="lt1"/>
-          </a:fontRef>
-        </p:style>
-        <p:txBody>
-          <a:bodyPr wrap="none" lIns="0" rIns="0" rtlCol="0" anchor="ctr"/>
-          <a:lstStyle/>
-          <a:p>
-            <a:pPr algn="ctr"/>
-            <a:r>
-              <a:rPr lang="en-AU" sz="2000" dirty="0">
-                <a:solidFill>
-                  <a:schemeClr val="tx1"/>
-                </a:solidFill>
-              </a:rPr>
-              <a:t>W</a:t>
-            </a:r>
-          </a:p>
-        </p:txBody>
-      </p:sp>
-      <p:sp>
-        <p:nvSpPr>
-          <p:cNvPr id="13" name="Rectangle 12"/>
-          <p:cNvSpPr/>
-          <p:nvPr/>
-        </p:nvSpPr>
-        <p:spPr>
-          <a:xfrm>
-            <a:off x="39153" y="5128590"/>
-            <a:ext cx="9828000" cy="1620000"/>
-          </a:xfrm>
-          <a:prstGeom prst="rect">
-            <a:avLst/>
-          </a:prstGeom>
-          <a:solidFill>
-            <a:schemeClr val="bg1"/>
-          </a:solidFill>
-          <a:ln>
-            <a:solidFill>
-              <a:schemeClr val="accent1">
-                <a:lumMod val="50000"/>
-              </a:schemeClr>
-            </a:solidFill>
-          </a:ln>
-        </p:spPr>
-        <p:style>
-          <a:lnRef idx="2">
-            <a:schemeClr val="accent1">
-              <a:shade val="50000"/>
-            </a:schemeClr>
-          </a:lnRef>
-          <a:fillRef idx="1">
-            <a:schemeClr val="accent1"/>
-          </a:fillRef>
-          <a:effectRef idx="0">
-            <a:schemeClr val="accent1"/>
-          </a:effectRef>
-          <a:fontRef idx="minor">
-            <a:schemeClr val="lt1"/>
-          </a:fontRef>
-        </p:style>
-        <p:txBody>
-          <a:bodyPr tIns="36000" rtlCol="0" anchor="t" anchorCtr="0"/>
-          <a:lstStyle/>
-          <a:p>
-            <a:r>
-              <a:rPr lang="en-AU" sz="2000" dirty="0" smtClean="0">
-                <a:solidFill>
-                  <a:schemeClr val="tx1"/>
-                </a:solidFill>
-              </a:rPr>
-              <a:t>Notes</a:t>
-            </a:r>
-          </a:p>
-          <a:p>
-            <a:r>
-              <a:rPr lang="en-AU" sz="2000" dirty="0" smtClean="0">
-                <a:solidFill>
-                  <a:schemeClr val="tx1"/>
-                </a:solidFill>
-              </a:rPr>
-              <a:t>Developers aren’t users of the website</a:t>
-            </a:r>
-          </a:p>
-        </p:txBody>
-      </p:sp>
-    </p:spTree>
-    <p:extLst>
-      <p:ext uri="{BB962C8B-B14F-4D97-AF65-F5344CB8AC3E}">
-        <p14:creationId xmlns:p14="http://schemas.microsoft.com/office/powerpoint/2010/main" val="219244569"/>
-      </p:ext>
-    </p:extLst>
-  </p:cSld>
-  <p:clrMapOvr>
-    <a:masterClrMapping/>
-  </p:clrMapOvr>
-</p:sld>
-</file>
-
-<file path=ppt/slides/slide26.xml><?xml version="1.0" encoding="utf-8"?>
-<p:sld xmlns:a="http://schemas.openxmlformats.org/drawingml/2006/main" xmlns:r="http://schemas.openxmlformats.org/officeDocument/2006/relationships" xmlns:p="http://schemas.openxmlformats.org/presentationml/2006/main">
-  <p:cSld>
-    <p:spTree>
-      <p:nvGrpSpPr>
-        <p:cNvPr id="1" name=""/>
-        <p:cNvGrpSpPr/>
-        <p:nvPr/>
-      </p:nvGrpSpPr>
-      <p:grpSpPr>
-        <a:xfrm>
-          <a:off x="0" y="0"/>
-          <a:ext cx="0" cy="0"/>
-          <a:chOff x="0" y="0"/>
-          <a:chExt cx="0" cy="0"/>
-        </a:xfrm>
-      </p:grpSpPr>
-      <p:sp>
-        <p:nvSpPr>
-          <p:cNvPr id="4" name="Rectangle 3"/>
-          <p:cNvSpPr/>
-          <p:nvPr/>
-        </p:nvSpPr>
-        <p:spPr>
-          <a:xfrm>
-            <a:off x="39153" y="109410"/>
-            <a:ext cx="720000" cy="540000"/>
-          </a:xfrm>
-          <a:prstGeom prst="rect">
-            <a:avLst/>
-          </a:prstGeom>
-          <a:solidFill>
-            <a:schemeClr val="accent1">
-              <a:lumMod val="40000"/>
-              <a:lumOff val="60000"/>
-            </a:schemeClr>
-          </a:solidFill>
-          <a:ln>
-            <a:solidFill>
-              <a:schemeClr val="accent1">
-                <a:lumMod val="50000"/>
-              </a:schemeClr>
-            </a:solidFill>
-          </a:ln>
-        </p:spPr>
-        <p:style>
-          <a:lnRef idx="2">
-            <a:schemeClr val="accent1">
-              <a:shade val="50000"/>
-            </a:schemeClr>
-          </a:lnRef>
-          <a:fillRef idx="1">
-            <a:schemeClr val="accent1"/>
-          </a:fillRef>
-          <a:effectRef idx="0">
-            <a:schemeClr val="accent1"/>
-          </a:effectRef>
-          <a:fontRef idx="minor">
-            <a:schemeClr val="lt1"/>
-          </a:fontRef>
-        </p:style>
-        <p:txBody>
-          <a:bodyPr wrap="square" lIns="0" rIns="0" rtlCol="0" anchor="ctr"/>
-          <a:lstStyle/>
-          <a:p>
-            <a:pPr algn="ctr"/>
-            <a:r>
-              <a:rPr lang="en-AU" sz="2000" dirty="0">
-                <a:solidFill>
-                  <a:schemeClr val="tx1"/>
-                </a:solidFill>
-              </a:rPr>
               <a:t>Story </a:t>
             </a:r>
             <a:r>
@@ -12193,7 +11643,31 @@
                   <a:schemeClr val="tx1"/>
                 </a:solidFill>
               </a:rPr>
-              <a:t>ID: 25 </a:t>
+              <a:t>ID</a:t>
+            </a:r>
+            <a:r>
+              <a:rPr lang="en-AU" sz="2000" smtClean="0">
+                <a:solidFill>
+                  <a:schemeClr val="tx1"/>
+                </a:solidFill>
+              </a:rPr>
+              <a:t>: </a:t>
+            </a:r>
+            <a:r>
+              <a:rPr lang="en-AU" sz="2000" smtClean="0">
+                <a:solidFill>
+                  <a:schemeClr val="tx1"/>
+                </a:solidFill>
+              </a:rPr>
+              <a:t>13</a:t>
+            </a:r>
+            <a:r>
+              <a:rPr lang="en-AU" sz="2000" smtClean="0">
+                <a:solidFill>
+                  <a:schemeClr val="tx1"/>
+                </a:solidFill>
+              </a:rPr>
+              <a:t> </a:t>
             </a:r>
             <a:endParaRPr lang="en-AU" sz="2000" dirty="0">
               <a:solidFill>

</xml_diff>